<commit_message>
Update powerpoint. Make demo show images instead of text
</commit_message>
<xml_diff>
--- a/docs/Flux & React.pptx
+++ b/docs/Flux & React.pptx
@@ -7,16 +7,21 @@
   <p:sldIdLst>
     <p:sldId id="256" r:id="rId2"/>
     <p:sldId id="261" r:id="rId3"/>
-    <p:sldId id="258" r:id="rId4"/>
-    <p:sldId id="259" r:id="rId5"/>
-    <p:sldId id="260" r:id="rId6"/>
-    <p:sldId id="263" r:id="rId7"/>
-    <p:sldId id="264" r:id="rId8"/>
-    <p:sldId id="265" r:id="rId9"/>
-    <p:sldId id="266" r:id="rId10"/>
-    <p:sldId id="268" r:id="rId11"/>
-    <p:sldId id="269" r:id="rId12"/>
-    <p:sldId id="270" r:id="rId13"/>
+    <p:sldId id="266" r:id="rId4"/>
+    <p:sldId id="268" r:id="rId5"/>
+    <p:sldId id="269" r:id="rId6"/>
+    <p:sldId id="270" r:id="rId7"/>
+    <p:sldId id="272" r:id="rId8"/>
+    <p:sldId id="258" r:id="rId9"/>
+    <p:sldId id="259" r:id="rId10"/>
+    <p:sldId id="260" r:id="rId11"/>
+    <p:sldId id="263" r:id="rId12"/>
+    <p:sldId id="264" r:id="rId13"/>
+    <p:sldId id="275" r:id="rId14"/>
+    <p:sldId id="277" r:id="rId15"/>
+    <p:sldId id="278" r:id="rId16"/>
+    <p:sldId id="279" r:id="rId17"/>
+    <p:sldId id="273" r:id="rId18"/>
   </p:sldIdLst>
   <p:sldSz cx="12192000" cy="6858000"/>
   <p:notesSz cx="6858000" cy="9144000"/>
@@ -122,16 +127,21 @@
           <p14:sldIdLst>
             <p14:sldId id="256"/>
             <p14:sldId id="261"/>
+            <p14:sldId id="266"/>
+            <p14:sldId id="268"/>
+            <p14:sldId id="269"/>
+            <p14:sldId id="270"/>
+            <p14:sldId id="272"/>
             <p14:sldId id="258"/>
             <p14:sldId id="259"/>
             <p14:sldId id="260"/>
             <p14:sldId id="263"/>
             <p14:sldId id="264"/>
-            <p14:sldId id="265"/>
-            <p14:sldId id="266"/>
-            <p14:sldId id="268"/>
-            <p14:sldId id="269"/>
-            <p14:sldId id="270"/>
+            <p14:sldId id="275"/>
+            <p14:sldId id="277"/>
+            <p14:sldId id="278"/>
+            <p14:sldId id="279"/>
+            <p14:sldId id="273"/>
           </p14:sldIdLst>
         </p14:section>
       </p14:sectionLst>
@@ -3563,10 +3573,59 @@
           <a:lstStyle/>
           <a:p>
             <a:r>
-              <a:rPr lang="en-US" dirty="0" smtClean="0"/>
-              <a:t>Flux &amp; React</a:t>
-            </a:r>
-            <a:endParaRPr lang="en-US" dirty="0"/>
+              <a:rPr lang="en-US" dirty="0" smtClean="0">
+                <a:solidFill>
+                  <a:srgbClr val="318435"/>
+                </a:solidFill>
+                <a:effectLst>
+                  <a:outerShdw blurRad="38100" dist="38100" dir="2700000" algn="tl">
+                    <a:srgbClr val="000000">
+                      <a:alpha val="43137"/>
+                    </a:srgbClr>
+                  </a:outerShdw>
+                </a:effectLst>
+              </a:rPr>
+              <a:t>Flux</a:t>
+            </a:r>
+            <a:r>
+              <a:rPr lang="en-US" dirty="0" smtClean="0">
+                <a:effectLst>
+                  <a:outerShdw blurRad="38100" dist="38100" dir="2700000" algn="tl">
+                    <a:srgbClr val="000000">
+                      <a:alpha val="43137"/>
+                    </a:srgbClr>
+                  </a:outerShdw>
+                </a:effectLst>
+              </a:rPr>
+              <a:t> &amp; </a:t>
+            </a:r>
+            <a:r>
+              <a:rPr lang="en-US" dirty="0" smtClean="0">
+                <a:solidFill>
+                  <a:srgbClr val="61DAFB"/>
+                </a:solidFill>
+                <a:effectLst>
+                  <a:outerShdw blurRad="38100" dist="38100" dir="2700000" algn="tl">
+                    <a:srgbClr val="000000">
+                      <a:alpha val="43137"/>
+                    </a:srgbClr>
+                  </a:outerShdw>
+                </a:effectLst>
+              </a:rPr>
+              <a:t>React</a:t>
+            </a:r>
+            <a:endParaRPr lang="en-US" dirty="0">
+              <a:solidFill>
+                <a:srgbClr val="61DAFB"/>
+              </a:solidFill>
+              <a:effectLst>
+                <a:outerShdw blurRad="38100" dist="38100" dir="2700000" algn="tl">
+                  <a:srgbClr val="000000">
+                    <a:alpha val="43137"/>
+                  </a:srgbClr>
+                </a:outerShdw>
+              </a:effectLst>
+            </a:endParaRPr>
           </a:p>
         </p:txBody>
       </p:sp>
@@ -3580,16 +3639,33 @@
             <p:ph type="subTitle" idx="1"/>
           </p:nvPr>
         </p:nvSpPr>
-        <p:spPr/>
-        <p:txBody>
-          <a:bodyPr/>
-          <a:lstStyle/>
-          <a:p>
-            <a:r>
-              <a:rPr lang="en-US" dirty="0" smtClean="0"/>
-              <a:t>Web Application Development</a:t>
-            </a:r>
-            <a:endParaRPr lang="en-US" dirty="0"/>
+        <p:spPr>
+          <a:xfrm>
+            <a:off x="1261872" y="4800599"/>
+            <a:ext cx="5646928" cy="1055255"/>
+          </a:xfrm>
+        </p:spPr>
+        <p:txBody>
+          <a:bodyPr>
+            <a:normAutofit/>
+          </a:bodyPr>
+          <a:lstStyle/>
+          <a:p>
+            <a:r>
+              <a:rPr lang="en-US" sz="2000" dirty="0" smtClean="0"/>
+              <a:t>Web Application Development	</a:t>
+            </a:r>
+          </a:p>
+          <a:p>
+            <a:r>
+              <a:rPr lang="en-US" sz="2000" dirty="0"/>
+              <a:t>Mark Repka, Rich Mcneary, Steve </a:t>
+            </a:r>
+            <a:r>
+              <a:rPr lang="en-US" sz="2000" dirty="0" smtClean="0"/>
+              <a:t>Mueller</a:t>
+            </a:r>
+            <a:endParaRPr lang="en-US" sz="2000" dirty="0"/>
           </a:p>
         </p:txBody>
       </p:sp>
@@ -3632,6 +3708,1769 @@
       </p:grpSpPr>
       <p:sp>
         <p:nvSpPr>
+          <p:cNvPr id="2" name="Title 1"/>
+          <p:cNvSpPr>
+            <a:spLocks noGrp="1"/>
+          </p:cNvSpPr>
+          <p:nvPr>
+            <p:ph type="title"/>
+          </p:nvPr>
+        </p:nvSpPr>
+        <p:spPr/>
+        <p:txBody>
+          <a:bodyPr/>
+          <a:lstStyle/>
+          <a:p>
+            <a:r>
+              <a:rPr lang="en-US" dirty="0" smtClean="0"/>
+              <a:t>React: Intro to JSX</a:t>
+            </a:r>
+            <a:endParaRPr lang="en-US" dirty="0"/>
+          </a:p>
+        </p:txBody>
+      </p:sp>
+      <p:sp>
+        <p:nvSpPr>
+          <p:cNvPr id="3" name="Content Placeholder 2"/>
+          <p:cNvSpPr>
+            <a:spLocks noGrp="1"/>
+          </p:cNvSpPr>
+          <p:nvPr>
+            <p:ph idx="1"/>
+          </p:nvPr>
+        </p:nvSpPr>
+        <p:spPr/>
+        <p:txBody>
+          <a:bodyPr/>
+          <a:lstStyle/>
+          <a:p>
+            <a:r>
+              <a:rPr lang="en-US" dirty="0" smtClean="0"/>
+              <a:t>JSX is a JavaScript syntax extension that looks similar to XML/HTML</a:t>
+            </a:r>
+          </a:p>
+          <a:p>
+            <a:r>
+              <a:rPr lang="en-US" dirty="0" smtClean="0"/>
+              <a:t>Offers a concise and familiar syntax for defining components with optional attributes and state</a:t>
+            </a:r>
+          </a:p>
+          <a:p>
+            <a:r>
+              <a:rPr lang="en-US" dirty="0" smtClean="0"/>
+              <a:t>It's more familiar for casual developers such as designers</a:t>
+            </a:r>
+          </a:p>
+          <a:p>
+            <a:endParaRPr lang="en-US" dirty="0" smtClean="0"/>
+          </a:p>
+          <a:p>
+            <a:pPr marL="0" indent="0">
+              <a:buNone/>
+            </a:pPr>
+            <a:r>
+              <a:rPr lang="en-US" dirty="0" smtClean="0"/>
+              <a:t>Each React component is displayed through its render function. This function returns some JSX that defines how the component will display on the page.</a:t>
+            </a:r>
+          </a:p>
+          <a:p>
+            <a:endParaRPr lang="en-US" dirty="0"/>
+          </a:p>
+        </p:txBody>
+      </p:sp>
+      <p:pic>
+        <p:nvPicPr>
+          <p:cNvPr id="4" name="Picture 3"/>
+          <p:cNvPicPr>
+            <a:picLocks noChangeAspect="1"/>
+          </p:cNvPicPr>
+          <p:nvPr/>
+        </p:nvPicPr>
+        <p:blipFill>
+          <a:blip r:embed="rId2"/>
+          <a:stretch>
+            <a:fillRect/>
+          </a:stretch>
+        </p:blipFill>
+        <p:spPr>
+          <a:xfrm>
+            <a:off x="2455574" y="4792373"/>
+            <a:ext cx="5267325" cy="1600200"/>
+          </a:xfrm>
+          <a:prstGeom prst="rect">
+            <a:avLst/>
+          </a:prstGeom>
+        </p:spPr>
+      </p:pic>
+    </p:spTree>
+    <p:extLst>
+      <p:ext uri="{BB962C8B-B14F-4D97-AF65-F5344CB8AC3E}">
+        <p14:creationId xmlns:p14="http://schemas.microsoft.com/office/powerpoint/2010/main" val="1299890869"/>
+      </p:ext>
+    </p:extLst>
+  </p:cSld>
+  <p:clrMapOvr>
+    <a:masterClrMapping/>
+  </p:clrMapOvr>
+  <p:timing>
+    <p:tnLst>
+      <p:par>
+        <p:cTn id="1" dur="indefinite" restart="never" nodeType="tmRoot"/>
+      </p:par>
+    </p:tnLst>
+  </p:timing>
+</p:sld>
+</file>
+
+<file path=ppt/slides/slide11.xml><?xml version="1.0" encoding="utf-8"?>
+<p:sld xmlns:a="http://schemas.openxmlformats.org/drawingml/2006/main" xmlns:r="http://schemas.openxmlformats.org/officeDocument/2006/relationships" xmlns:p="http://schemas.openxmlformats.org/presentationml/2006/main">
+  <p:cSld>
+    <p:spTree>
+      <p:nvGrpSpPr>
+        <p:cNvPr id="1" name=""/>
+        <p:cNvGrpSpPr/>
+        <p:nvPr/>
+      </p:nvGrpSpPr>
+      <p:grpSpPr>
+        <a:xfrm>
+          <a:off x="0" y="0"/>
+          <a:ext cx="0" cy="0"/>
+          <a:chOff x="0" y="0"/>
+          <a:chExt cx="0" cy="0"/>
+        </a:xfrm>
+      </p:grpSpPr>
+      <p:sp>
+        <p:nvSpPr>
+          <p:cNvPr id="2" name="Title 1"/>
+          <p:cNvSpPr>
+            <a:spLocks noGrp="1"/>
+          </p:cNvSpPr>
+          <p:nvPr>
+            <p:ph type="title"/>
+          </p:nvPr>
+        </p:nvSpPr>
+        <p:spPr/>
+        <p:txBody>
+          <a:bodyPr/>
+          <a:lstStyle/>
+          <a:p>
+            <a:r>
+              <a:rPr lang="en-US" dirty="0" smtClean="0"/>
+              <a:t>React: Intro </a:t>
+            </a:r>
+            <a:r>
+              <a:rPr lang="en-US" dirty="0"/>
+              <a:t>to JSX</a:t>
+            </a:r>
+          </a:p>
+        </p:txBody>
+      </p:sp>
+      <p:sp>
+        <p:nvSpPr>
+          <p:cNvPr id="3" name="Content Placeholder 2"/>
+          <p:cNvSpPr>
+            <a:spLocks noGrp="1"/>
+          </p:cNvSpPr>
+          <p:nvPr>
+            <p:ph idx="1"/>
+          </p:nvPr>
+        </p:nvSpPr>
+        <p:spPr/>
+        <p:txBody>
+          <a:bodyPr/>
+          <a:lstStyle/>
+          <a:p>
+            <a:r>
+              <a:rPr lang="en-US" dirty="0" smtClean="0"/>
+              <a:t>This Render function and some helper JavaScript variables lets us do some really useful things!</a:t>
+            </a:r>
+            <a:endParaRPr lang="en-US" dirty="0"/>
+          </a:p>
+          <a:p>
+            <a:r>
+              <a:rPr lang="en-US" dirty="0" smtClean="0"/>
+              <a:t>Dynamically creating a number of React components from values in a JavaScript array</a:t>
+            </a:r>
+          </a:p>
+          <a:p>
+            <a:endParaRPr lang="en-US" dirty="0"/>
+          </a:p>
+          <a:p>
+            <a:endParaRPr lang="en-US" dirty="0" smtClean="0"/>
+          </a:p>
+          <a:p>
+            <a:endParaRPr lang="en-US" dirty="0" smtClean="0"/>
+          </a:p>
+        </p:txBody>
+      </p:sp>
+      <p:pic>
+        <p:nvPicPr>
+          <p:cNvPr id="4" name="Picture 3"/>
+          <p:cNvPicPr>
+            <a:picLocks noChangeAspect="1"/>
+          </p:cNvPicPr>
+          <p:nvPr/>
+        </p:nvPicPr>
+        <p:blipFill>
+          <a:blip r:embed="rId2"/>
+          <a:stretch>
+            <a:fillRect/>
+          </a:stretch>
+        </p:blipFill>
+        <p:spPr>
+          <a:xfrm>
+            <a:off x="1261872" y="3374735"/>
+            <a:ext cx="5172075" cy="3257550"/>
+          </a:xfrm>
+          <a:prstGeom prst="rect">
+            <a:avLst/>
+          </a:prstGeom>
+        </p:spPr>
+      </p:pic>
+      <p:pic>
+        <p:nvPicPr>
+          <p:cNvPr id="5" name="Picture 4"/>
+          <p:cNvPicPr>
+            <a:picLocks noChangeAspect="1"/>
+          </p:cNvPicPr>
+          <p:nvPr/>
+        </p:nvPicPr>
+        <p:blipFill>
+          <a:blip r:embed="rId3"/>
+          <a:stretch>
+            <a:fillRect/>
+          </a:stretch>
+        </p:blipFill>
+        <p:spPr>
+          <a:xfrm>
+            <a:off x="6742557" y="3541208"/>
+            <a:ext cx="3114675" cy="1562100"/>
+          </a:xfrm>
+          <a:prstGeom prst="rect">
+            <a:avLst/>
+          </a:prstGeom>
+        </p:spPr>
+      </p:pic>
+    </p:spTree>
+    <p:extLst>
+      <p:ext uri="{BB962C8B-B14F-4D97-AF65-F5344CB8AC3E}">
+        <p14:creationId xmlns:p14="http://schemas.microsoft.com/office/powerpoint/2010/main" val="3245742540"/>
+      </p:ext>
+    </p:extLst>
+  </p:cSld>
+  <p:clrMapOvr>
+    <a:masterClrMapping/>
+  </p:clrMapOvr>
+  <p:timing>
+    <p:tnLst>
+      <p:par>
+        <p:cTn id="1" dur="indefinite" restart="never" nodeType="tmRoot"/>
+      </p:par>
+    </p:tnLst>
+  </p:timing>
+</p:sld>
+</file>
+
+<file path=ppt/slides/slide12.xml><?xml version="1.0" encoding="utf-8"?>
+<p:sld xmlns:a="http://schemas.openxmlformats.org/drawingml/2006/main" xmlns:r="http://schemas.openxmlformats.org/officeDocument/2006/relationships" xmlns:p="http://schemas.openxmlformats.org/presentationml/2006/main">
+  <p:cSld>
+    <p:spTree>
+      <p:nvGrpSpPr>
+        <p:cNvPr id="1" name=""/>
+        <p:cNvGrpSpPr/>
+        <p:nvPr/>
+      </p:nvGrpSpPr>
+      <p:grpSpPr>
+        <a:xfrm>
+          <a:off x="0" y="0"/>
+          <a:ext cx="0" cy="0"/>
+          <a:chOff x="0" y="0"/>
+          <a:chExt cx="0" cy="0"/>
+        </a:xfrm>
+      </p:grpSpPr>
+      <p:sp>
+        <p:nvSpPr>
+          <p:cNvPr id="2" name="Title 1"/>
+          <p:cNvSpPr>
+            <a:spLocks noGrp="1"/>
+          </p:cNvSpPr>
+          <p:nvPr>
+            <p:ph type="title"/>
+          </p:nvPr>
+        </p:nvSpPr>
+        <p:spPr/>
+        <p:txBody>
+          <a:bodyPr/>
+          <a:lstStyle/>
+          <a:p>
+            <a:r>
+              <a:rPr lang="en-US" dirty="0" smtClean="0"/>
+              <a:t>React: Component State</a:t>
+            </a:r>
+            <a:endParaRPr lang="en-US" dirty="0"/>
+          </a:p>
+        </p:txBody>
+      </p:sp>
+      <p:sp>
+        <p:nvSpPr>
+          <p:cNvPr id="3" name="Content Placeholder 2"/>
+          <p:cNvSpPr>
+            <a:spLocks noGrp="1"/>
+          </p:cNvSpPr>
+          <p:nvPr>
+            <p:ph idx="1"/>
+          </p:nvPr>
+        </p:nvSpPr>
+        <p:spPr/>
+        <p:txBody>
+          <a:bodyPr/>
+          <a:lstStyle/>
+          <a:p>
+            <a:r>
+              <a:rPr lang="en-US" dirty="0" smtClean="0"/>
+              <a:t>More complex React components can have some state information that helps them decide how they should render and display.</a:t>
+            </a:r>
+          </a:p>
+          <a:p>
+            <a:pPr lvl="1"/>
+            <a:r>
+              <a:rPr lang="en-US" dirty="0" smtClean="0"/>
+              <a:t>This could include data like our little example array from before</a:t>
+            </a:r>
+            <a:endParaRPr lang="en-US" dirty="0"/>
+          </a:p>
+          <a:p>
+            <a:r>
+              <a:rPr lang="en-US" dirty="0" smtClean="0"/>
+              <a:t>If the state changes it will trigger a call to the render method so the component can be updated.</a:t>
+            </a:r>
+          </a:p>
+          <a:p>
+            <a:r>
+              <a:rPr lang="en-US" dirty="0" smtClean="0"/>
+              <a:t>Some initial state can be defined in a component by </a:t>
+            </a:r>
+            <a:r>
+              <a:rPr lang="en-US" dirty="0"/>
+              <a:t>overriding the </a:t>
+            </a:r>
+            <a:r>
+              <a:rPr lang="en-US" dirty="0" err="1" smtClean="0"/>
+              <a:t>getInitialState</a:t>
+            </a:r>
+            <a:r>
+              <a:rPr lang="en-US" dirty="0" smtClean="0"/>
+              <a:t> function</a:t>
+            </a:r>
+          </a:p>
+          <a:p>
+            <a:endParaRPr lang="en-US" dirty="0"/>
+          </a:p>
+          <a:p>
+            <a:endParaRPr lang="en-US" dirty="0"/>
+          </a:p>
+          <a:p>
+            <a:endParaRPr lang="en-US" dirty="0" smtClean="0"/>
+          </a:p>
+        </p:txBody>
+      </p:sp>
+      <p:pic>
+        <p:nvPicPr>
+          <p:cNvPr id="6" name="Picture 5"/>
+          <p:cNvPicPr>
+            <a:picLocks noChangeAspect="1"/>
+          </p:cNvPicPr>
+          <p:nvPr/>
+        </p:nvPicPr>
+        <p:blipFill>
+          <a:blip r:embed="rId2"/>
+          <a:stretch>
+            <a:fillRect/>
+          </a:stretch>
+        </p:blipFill>
+        <p:spPr>
+          <a:xfrm>
+            <a:off x="1916239" y="4623868"/>
+            <a:ext cx="7286625" cy="1466850"/>
+          </a:xfrm>
+          <a:prstGeom prst="rect">
+            <a:avLst/>
+          </a:prstGeom>
+        </p:spPr>
+      </p:pic>
+    </p:spTree>
+    <p:extLst>
+      <p:ext uri="{BB962C8B-B14F-4D97-AF65-F5344CB8AC3E}">
+        <p14:creationId xmlns:p14="http://schemas.microsoft.com/office/powerpoint/2010/main" val="3199261419"/>
+      </p:ext>
+    </p:extLst>
+  </p:cSld>
+  <p:clrMapOvr>
+    <a:masterClrMapping/>
+  </p:clrMapOvr>
+  <p:timing>
+    <p:tnLst>
+      <p:par>
+        <p:cTn id="1" dur="indefinite" restart="never" nodeType="tmRoot"/>
+      </p:par>
+    </p:tnLst>
+  </p:timing>
+</p:sld>
+</file>
+
+<file path=ppt/slides/slide13.xml><?xml version="1.0" encoding="utf-8"?>
+<p:sld xmlns:a="http://schemas.openxmlformats.org/drawingml/2006/main" xmlns:r="http://schemas.openxmlformats.org/officeDocument/2006/relationships" xmlns:p="http://schemas.openxmlformats.org/presentationml/2006/main">
+  <p:cSld>
+    <p:spTree>
+      <p:nvGrpSpPr>
+        <p:cNvPr id="1" name=""/>
+        <p:cNvGrpSpPr/>
+        <p:nvPr/>
+      </p:nvGrpSpPr>
+      <p:grpSpPr>
+        <a:xfrm>
+          <a:off x="0" y="0"/>
+          <a:ext cx="0" cy="0"/>
+          <a:chOff x="0" y="0"/>
+          <a:chExt cx="0" cy="0"/>
+        </a:xfrm>
+      </p:grpSpPr>
+      <p:sp>
+        <p:nvSpPr>
+          <p:cNvPr id="2" name="Title 1"/>
+          <p:cNvSpPr>
+            <a:spLocks noGrp="1"/>
+          </p:cNvSpPr>
+          <p:nvPr>
+            <p:ph type="title"/>
+          </p:nvPr>
+        </p:nvSpPr>
+        <p:spPr>
+          <a:xfrm>
+            <a:off x="1261872" y="350982"/>
+            <a:ext cx="9692640" cy="786158"/>
+          </a:xfrm>
+        </p:spPr>
+        <p:txBody>
+          <a:bodyPr/>
+          <a:lstStyle/>
+          <a:p>
+            <a:r>
+              <a:rPr lang="en-US" dirty="0" smtClean="0"/>
+              <a:t>React: Virtual DOM</a:t>
+            </a:r>
+            <a:endParaRPr lang="en-US" sz="2400" dirty="0"/>
+          </a:p>
+        </p:txBody>
+      </p:sp>
+      <p:sp>
+        <p:nvSpPr>
+          <p:cNvPr id="3" name="Content Placeholder 2"/>
+          <p:cNvSpPr>
+            <a:spLocks noGrp="1"/>
+          </p:cNvSpPr>
+          <p:nvPr>
+            <p:ph idx="1"/>
+          </p:nvPr>
+        </p:nvSpPr>
+        <p:spPr>
+          <a:xfrm>
+            <a:off x="1261872" y="1228436"/>
+            <a:ext cx="8595360" cy="4951701"/>
+          </a:xfrm>
+        </p:spPr>
+        <p:txBody>
+          <a:bodyPr>
+            <a:normAutofit/>
+          </a:bodyPr>
+          <a:lstStyle/>
+          <a:p>
+            <a:r>
+              <a:rPr lang="en-US" dirty="0" smtClean="0"/>
+              <a:t>One of the most important things in any application, web or otherwise, is performance. React has some very interesting features to help improve its performance over other popular web frameworks.</a:t>
+            </a:r>
+          </a:p>
+          <a:p>
+            <a:pPr marL="0" indent="0">
+              <a:buNone/>
+            </a:pPr>
+            <a:endParaRPr lang="en-US" dirty="0" smtClean="0"/>
+          </a:p>
+          <a:p>
+            <a:r>
+              <a:rPr lang="en-US" dirty="0" smtClean="0"/>
+              <a:t>The Document </a:t>
+            </a:r>
+            <a:r>
+              <a:rPr lang="en-US" dirty="0"/>
+              <a:t>Object </a:t>
+            </a:r>
+            <a:r>
+              <a:rPr lang="en-US" dirty="0" smtClean="0"/>
+              <a:t>Model (DOM)</a:t>
+            </a:r>
+          </a:p>
+          <a:p>
+            <a:pPr lvl="1"/>
+            <a:r>
+              <a:rPr lang="en-US" dirty="0" smtClean="0"/>
+              <a:t>Structured representation of a document - in this case our web page</a:t>
+            </a:r>
+          </a:p>
+          <a:p>
+            <a:pPr lvl="1"/>
+            <a:r>
+              <a:rPr lang="en-US" dirty="0" smtClean="0"/>
+              <a:t>A tree structure of nodes and objects that each can have different properties and methods</a:t>
+            </a:r>
+            <a:endParaRPr lang="en-US" dirty="0"/>
+          </a:p>
+          <a:p>
+            <a:pPr marL="0" indent="0">
+              <a:buNone/>
+            </a:pPr>
+            <a:endParaRPr lang="en-US" dirty="0" smtClean="0"/>
+          </a:p>
+          <a:p>
+            <a:pPr marL="0" indent="0">
+              <a:buNone/>
+            </a:pPr>
+            <a:r>
+              <a:rPr lang="en-US" dirty="0" smtClean="0"/>
+              <a:t>Interacting with this DOM ourselves is slow and tricky to handle correctly.  React removes this difficulty of dealing directly with the webpage DOM by introducing the idea of a Virtual DOM</a:t>
+            </a:r>
+          </a:p>
+        </p:txBody>
+      </p:sp>
+    </p:spTree>
+    <p:extLst>
+      <p:ext uri="{BB962C8B-B14F-4D97-AF65-F5344CB8AC3E}">
+        <p14:creationId xmlns:p14="http://schemas.microsoft.com/office/powerpoint/2010/main" val="1983976656"/>
+      </p:ext>
+    </p:extLst>
+  </p:cSld>
+  <p:clrMapOvr>
+    <a:masterClrMapping/>
+  </p:clrMapOvr>
+</p:sld>
+</file>
+
+<file path=ppt/slides/slide14.xml><?xml version="1.0" encoding="utf-8"?>
+<p:sld xmlns:a="http://schemas.openxmlformats.org/drawingml/2006/main" xmlns:r="http://schemas.openxmlformats.org/officeDocument/2006/relationships" xmlns:p="http://schemas.openxmlformats.org/presentationml/2006/main">
+  <p:cSld>
+    <p:spTree>
+      <p:nvGrpSpPr>
+        <p:cNvPr id="1" name=""/>
+        <p:cNvGrpSpPr/>
+        <p:nvPr/>
+      </p:nvGrpSpPr>
+      <p:grpSpPr>
+        <a:xfrm>
+          <a:off x="0" y="0"/>
+          <a:ext cx="0" cy="0"/>
+          <a:chOff x="0" y="0"/>
+          <a:chExt cx="0" cy="0"/>
+        </a:xfrm>
+      </p:grpSpPr>
+      <p:sp>
+        <p:nvSpPr>
+          <p:cNvPr id="2" name="Title 1"/>
+          <p:cNvSpPr>
+            <a:spLocks noGrp="1"/>
+          </p:cNvSpPr>
+          <p:nvPr>
+            <p:ph type="title"/>
+          </p:nvPr>
+        </p:nvSpPr>
+        <p:spPr>
+          <a:xfrm>
+            <a:off x="1261872" y="350982"/>
+            <a:ext cx="9692640" cy="786158"/>
+          </a:xfrm>
+        </p:spPr>
+        <p:txBody>
+          <a:bodyPr/>
+          <a:lstStyle/>
+          <a:p>
+            <a:r>
+              <a:rPr lang="en-US" dirty="0" smtClean="0"/>
+              <a:t>React: Virtual DOM</a:t>
+            </a:r>
+            <a:endParaRPr lang="en-US" sz="2400" dirty="0"/>
+          </a:p>
+        </p:txBody>
+      </p:sp>
+      <p:sp>
+        <p:nvSpPr>
+          <p:cNvPr id="3" name="Content Placeholder 2"/>
+          <p:cNvSpPr>
+            <a:spLocks noGrp="1"/>
+          </p:cNvSpPr>
+          <p:nvPr>
+            <p:ph idx="1"/>
+          </p:nvPr>
+        </p:nvSpPr>
+        <p:spPr>
+          <a:xfrm>
+            <a:off x="1261872" y="1228436"/>
+            <a:ext cx="8595360" cy="4951701"/>
+          </a:xfrm>
+        </p:spPr>
+        <p:txBody>
+          <a:bodyPr>
+            <a:normAutofit/>
+          </a:bodyPr>
+          <a:lstStyle/>
+          <a:p>
+            <a:pPr marL="0" indent="0">
+              <a:buNone/>
+            </a:pPr>
+            <a:r>
+              <a:rPr lang="en-US" dirty="0"/>
+              <a:t>Whenever you call </a:t>
+            </a:r>
+            <a:r>
+              <a:rPr lang="en-US" dirty="0" err="1" smtClean="0"/>
+              <a:t>setState</a:t>
+            </a:r>
+            <a:r>
+              <a:rPr lang="en-US" dirty="0" smtClean="0"/>
+              <a:t>( ) </a:t>
+            </a:r>
+            <a:r>
+              <a:rPr lang="en-US" dirty="0"/>
+              <a:t>on a component, React will mark it as dirty</a:t>
+            </a:r>
+            <a:r>
+              <a:rPr lang="en-US" dirty="0" smtClean="0"/>
+              <a:t>. At </a:t>
+            </a:r>
+            <a:r>
+              <a:rPr lang="en-US" dirty="0"/>
+              <a:t>the end of the event loop, </a:t>
+            </a:r>
+            <a:r>
+              <a:rPr lang="en-US" dirty="0" smtClean="0"/>
+              <a:t>when all of the render methods have cascaded through, React </a:t>
+            </a:r>
+            <a:r>
+              <a:rPr lang="en-US" dirty="0"/>
+              <a:t>looks at all the dirty components and </a:t>
+            </a:r>
+            <a:r>
+              <a:rPr lang="en-US" dirty="0" smtClean="0"/>
+              <a:t>compares the result of the new state to the existing DOM and does a single calculated update.</a:t>
+            </a:r>
+          </a:p>
+          <a:p>
+            <a:pPr marL="0" indent="0">
+              <a:buNone/>
+            </a:pPr>
+            <a:endParaRPr lang="en-US" dirty="0"/>
+          </a:p>
+          <a:p>
+            <a:pPr marL="0" indent="0">
+              <a:buNone/>
+            </a:pPr>
+            <a:endParaRPr lang="en-US" dirty="0" smtClean="0"/>
+          </a:p>
+          <a:p>
+            <a:pPr marL="0" indent="0">
+              <a:buNone/>
+            </a:pPr>
+            <a:endParaRPr lang="en-US" dirty="0"/>
+          </a:p>
+        </p:txBody>
+      </p:sp>
+      <p:pic>
+        <p:nvPicPr>
+          <p:cNvPr id="3078" name="Picture 6" descr="http://calendar.perfplanet.com/wp-content/uploads/2013/12/vjeux/4.png"/>
+          <p:cNvPicPr>
+            <a:picLocks noChangeAspect="1" noChangeArrowheads="1"/>
+          </p:cNvPicPr>
+          <p:nvPr/>
+        </p:nvPicPr>
+        <p:blipFill>
+          <a:blip r:embed="rId2">
+            <a:extLst>
+              <a:ext uri="{28A0092B-C50C-407E-A947-70E740481C1C}">
+                <a14:useLocalDpi xmlns:a14="http://schemas.microsoft.com/office/drawing/2010/main" val="0"/>
+              </a:ext>
+            </a:extLst>
+          </a:blip>
+          <a:srcRect/>
+          <a:stretch>
+            <a:fillRect/>
+          </a:stretch>
+        </p:blipFill>
+        <p:spPr bwMode="auto">
+          <a:xfrm>
+            <a:off x="2632363" y="2538172"/>
+            <a:ext cx="4655127" cy="2447767"/>
+          </a:xfrm>
+          <a:prstGeom prst="rect">
+            <a:avLst/>
+          </a:prstGeom>
+          <a:noFill/>
+          <a:extLst>
+            <a:ext uri="{909E8E84-426E-40DD-AFC4-6F175D3DCCD1}">
+              <a14:hiddenFill xmlns:a14="http://schemas.microsoft.com/office/drawing/2010/main">
+                <a:solidFill>
+                  <a:srgbClr val="FFFFFF"/>
+                </a:solidFill>
+              </a14:hiddenFill>
+            </a:ext>
+          </a:extLst>
+        </p:spPr>
+      </p:pic>
+      <p:sp>
+        <p:nvSpPr>
+          <p:cNvPr id="7" name="Rectangle 6"/>
+          <p:cNvSpPr/>
+          <p:nvPr/>
+        </p:nvSpPr>
+        <p:spPr>
+          <a:xfrm>
+            <a:off x="4516080" y="3244334"/>
+            <a:ext cx="3159839" cy="369332"/>
+          </a:xfrm>
+          <a:prstGeom prst="rect">
+            <a:avLst/>
+          </a:prstGeom>
+        </p:spPr>
+        <p:txBody>
+          <a:bodyPr wrap="none">
+            <a:spAutoFit/>
+          </a:bodyPr>
+          <a:lstStyle/>
+          <a:p>
+            <a:r>
+              <a:rPr lang="en-US" dirty="0">
+                <a:solidFill>
+                  <a:srgbClr val="FFFFFF"/>
+                </a:solidFill>
+                <a:latin typeface="arial" panose="020B0604020202020204" pitchFamily="34" charset="0"/>
+              </a:rPr>
+              <a:t>Facebook Software Engineer</a:t>
+            </a:r>
+            <a:endParaRPr lang="en-US" dirty="0"/>
+          </a:p>
+        </p:txBody>
+      </p:sp>
+      <p:sp>
+        <p:nvSpPr>
+          <p:cNvPr id="8" name="Rectangle 7"/>
+          <p:cNvSpPr/>
+          <p:nvPr/>
+        </p:nvSpPr>
+        <p:spPr>
+          <a:xfrm>
+            <a:off x="125678" y="6386970"/>
+            <a:ext cx="3531736" cy="430887"/>
+          </a:xfrm>
+          <a:prstGeom prst="rect">
+            <a:avLst/>
+          </a:prstGeom>
+        </p:spPr>
+        <p:txBody>
+          <a:bodyPr wrap="none">
+            <a:spAutoFit/>
+          </a:bodyPr>
+          <a:lstStyle/>
+          <a:p>
+            <a:r>
+              <a:rPr lang="en-US" sz="1100" dirty="0" smtClean="0"/>
+              <a:t>http</a:t>
+            </a:r>
+            <a:r>
+              <a:rPr lang="en-US" sz="1100" dirty="0"/>
+              <a:t>://calendar.perfplanet.com/2013/diff</a:t>
+            </a:r>
+            <a:r>
+              <a:rPr lang="en-US" sz="1100" dirty="0" smtClean="0"/>
+              <a:t>/</a:t>
+            </a:r>
+            <a:br>
+              <a:rPr lang="en-US" sz="1100" dirty="0" smtClean="0"/>
+            </a:br>
+            <a:r>
+              <a:rPr lang="en-US" sz="1100" dirty="0" smtClean="0"/>
+              <a:t>Facebook </a:t>
+            </a:r>
+            <a:r>
+              <a:rPr lang="en-US" sz="1100" dirty="0"/>
+              <a:t>Software </a:t>
+            </a:r>
+            <a:r>
+              <a:rPr lang="en-US" sz="1100" dirty="0" smtClean="0"/>
+              <a:t>Engineer</a:t>
+            </a:r>
+            <a:r>
+              <a:rPr lang="en-US" sz="1100" dirty="0"/>
+              <a:t>, Christopher </a:t>
+            </a:r>
+            <a:r>
+              <a:rPr lang="en-US" sz="1100" dirty="0" err="1" smtClean="0"/>
+              <a:t>Chedeau</a:t>
+            </a:r>
+            <a:endParaRPr lang="en-US" sz="1100" dirty="0"/>
+          </a:p>
+        </p:txBody>
+      </p:sp>
+      <p:sp>
+        <p:nvSpPr>
+          <p:cNvPr id="9" name="Rectangle 8"/>
+          <p:cNvSpPr/>
+          <p:nvPr/>
+        </p:nvSpPr>
+        <p:spPr>
+          <a:xfrm>
+            <a:off x="1261872" y="5314057"/>
+            <a:ext cx="8567650" cy="646331"/>
+          </a:xfrm>
+          <a:prstGeom prst="rect">
+            <a:avLst/>
+          </a:prstGeom>
+        </p:spPr>
+        <p:txBody>
+          <a:bodyPr wrap="square">
+            <a:spAutoFit/>
+          </a:bodyPr>
+          <a:lstStyle/>
+          <a:p>
+            <a:r>
+              <a:rPr lang="en-US" dirty="0" smtClean="0"/>
+              <a:t>This </a:t>
+            </a:r>
+            <a:r>
+              <a:rPr lang="en-US" dirty="0"/>
+              <a:t>means that, per any number of updates in that event loop, there is exactly one time when the DOM is being </a:t>
+            </a:r>
+            <a:r>
+              <a:rPr lang="en-US" dirty="0" smtClean="0"/>
+              <a:t>updated.</a:t>
+            </a:r>
+            <a:endParaRPr lang="en-US" dirty="0"/>
+          </a:p>
+        </p:txBody>
+      </p:sp>
+    </p:spTree>
+    <p:extLst>
+      <p:ext uri="{BB962C8B-B14F-4D97-AF65-F5344CB8AC3E}">
+        <p14:creationId xmlns:p14="http://schemas.microsoft.com/office/powerpoint/2010/main" val="2083052914"/>
+      </p:ext>
+    </p:extLst>
+  </p:cSld>
+  <p:clrMapOvr>
+    <a:masterClrMapping/>
+  </p:clrMapOvr>
+</p:sld>
+</file>
+
+<file path=ppt/slides/slide15.xml><?xml version="1.0" encoding="utf-8"?>
+<p:sld xmlns:a="http://schemas.openxmlformats.org/drawingml/2006/main" xmlns:r="http://schemas.openxmlformats.org/officeDocument/2006/relationships" xmlns:p="http://schemas.openxmlformats.org/presentationml/2006/main">
+  <p:cSld>
+    <p:spTree>
+      <p:nvGrpSpPr>
+        <p:cNvPr id="1" name=""/>
+        <p:cNvGrpSpPr/>
+        <p:nvPr/>
+      </p:nvGrpSpPr>
+      <p:grpSpPr>
+        <a:xfrm>
+          <a:off x="0" y="0"/>
+          <a:ext cx="0" cy="0"/>
+          <a:chOff x="0" y="0"/>
+          <a:chExt cx="0" cy="0"/>
+        </a:xfrm>
+      </p:grpSpPr>
+      <p:sp>
+        <p:nvSpPr>
+          <p:cNvPr id="2" name="Title 1"/>
+          <p:cNvSpPr>
+            <a:spLocks noGrp="1"/>
+          </p:cNvSpPr>
+          <p:nvPr>
+            <p:ph type="title"/>
+          </p:nvPr>
+        </p:nvSpPr>
+        <p:spPr>
+          <a:xfrm>
+            <a:off x="1261872" y="350982"/>
+            <a:ext cx="9692640" cy="786158"/>
+          </a:xfrm>
+        </p:spPr>
+        <p:txBody>
+          <a:bodyPr/>
+          <a:lstStyle/>
+          <a:p>
+            <a:r>
+              <a:rPr lang="en-US" dirty="0" smtClean="0"/>
+              <a:t>React: Virtual DOM</a:t>
+            </a:r>
+            <a:endParaRPr lang="en-US" sz="2400" dirty="0"/>
+          </a:p>
+        </p:txBody>
+      </p:sp>
+      <p:sp>
+        <p:nvSpPr>
+          <p:cNvPr id="3" name="Content Placeholder 2"/>
+          <p:cNvSpPr>
+            <a:spLocks noGrp="1"/>
+          </p:cNvSpPr>
+          <p:nvPr>
+            <p:ph idx="1"/>
+          </p:nvPr>
+        </p:nvSpPr>
+        <p:spPr>
+          <a:xfrm>
+            <a:off x="1261872" y="1228436"/>
+            <a:ext cx="8595360" cy="4951701"/>
+          </a:xfrm>
+        </p:spPr>
+        <p:txBody>
+          <a:bodyPr>
+            <a:normAutofit/>
+          </a:bodyPr>
+          <a:lstStyle/>
+          <a:p>
+            <a:pPr marL="0" indent="0">
+              <a:buNone/>
+            </a:pPr>
+            <a:r>
+              <a:rPr lang="en-US" dirty="0" smtClean="0"/>
+              <a:t>This method is great news for performance since we are usually only updating nodes at the bottom of the tree, not at the top!</a:t>
+            </a:r>
+          </a:p>
+          <a:p>
+            <a:pPr marL="0" indent="0">
+              <a:buNone/>
+            </a:pPr>
+            <a:r>
+              <a:rPr lang="en-US" dirty="0" smtClean="0"/>
+              <a:t>This </a:t>
+            </a:r>
+            <a:r>
+              <a:rPr lang="en-US" dirty="0"/>
+              <a:t>means that changes are localized to where the user </a:t>
+            </a:r>
+            <a:r>
+              <a:rPr lang="en-US" dirty="0" smtClean="0"/>
+              <a:t>interacts and does not normally involve updating the entire DOM each time.</a:t>
+            </a:r>
+            <a:endParaRPr lang="en-US" dirty="0"/>
+          </a:p>
+          <a:p>
+            <a:pPr marL="0" indent="0">
+              <a:buNone/>
+            </a:pPr>
+            <a:endParaRPr lang="en-US" dirty="0" smtClean="0"/>
+          </a:p>
+          <a:p>
+            <a:pPr marL="0" indent="0">
+              <a:buNone/>
+            </a:pPr>
+            <a:endParaRPr lang="en-US" dirty="0"/>
+          </a:p>
+        </p:txBody>
+      </p:sp>
+      <p:pic>
+        <p:nvPicPr>
+          <p:cNvPr id="4100" name="Picture 4" descr="http://calendar.perfplanet.com/wp-content/uploads/2013/12/vjeux/5.png"/>
+          <p:cNvPicPr>
+            <a:picLocks noChangeAspect="1" noChangeArrowheads="1"/>
+          </p:cNvPicPr>
+          <p:nvPr/>
+        </p:nvPicPr>
+        <p:blipFill>
+          <a:blip r:embed="rId2">
+            <a:extLst>
+              <a:ext uri="{28A0092B-C50C-407E-A947-70E740481C1C}">
+                <a14:useLocalDpi xmlns:a14="http://schemas.microsoft.com/office/drawing/2010/main" val="0"/>
+              </a:ext>
+            </a:extLst>
+          </a:blip>
+          <a:srcRect/>
+          <a:stretch>
+            <a:fillRect/>
+          </a:stretch>
+        </p:blipFill>
+        <p:spPr bwMode="auto">
+          <a:xfrm>
+            <a:off x="2954764" y="2928071"/>
+            <a:ext cx="4214675" cy="2235056"/>
+          </a:xfrm>
+          <a:prstGeom prst="rect">
+            <a:avLst/>
+          </a:prstGeom>
+          <a:noFill/>
+          <a:extLst>
+            <a:ext uri="{909E8E84-426E-40DD-AFC4-6F175D3DCCD1}">
+              <a14:hiddenFill xmlns:a14="http://schemas.microsoft.com/office/drawing/2010/main">
+                <a:solidFill>
+                  <a:srgbClr val="FFFFFF"/>
+                </a:solidFill>
+              </a14:hiddenFill>
+            </a:ext>
+          </a:extLst>
+        </p:spPr>
+      </p:pic>
+      <p:sp>
+        <p:nvSpPr>
+          <p:cNvPr id="9" name="Rectangle 8"/>
+          <p:cNvSpPr/>
+          <p:nvPr/>
+        </p:nvSpPr>
+        <p:spPr>
+          <a:xfrm>
+            <a:off x="125678" y="6386970"/>
+            <a:ext cx="3531736" cy="430887"/>
+          </a:xfrm>
+          <a:prstGeom prst="rect">
+            <a:avLst/>
+          </a:prstGeom>
+        </p:spPr>
+        <p:txBody>
+          <a:bodyPr wrap="none">
+            <a:spAutoFit/>
+          </a:bodyPr>
+          <a:lstStyle/>
+          <a:p>
+            <a:r>
+              <a:rPr lang="en-US" sz="1100" dirty="0" smtClean="0"/>
+              <a:t>http</a:t>
+            </a:r>
+            <a:r>
+              <a:rPr lang="en-US" sz="1100" dirty="0"/>
+              <a:t>://calendar.perfplanet.com/2013/diff</a:t>
+            </a:r>
+            <a:r>
+              <a:rPr lang="en-US" sz="1100" dirty="0" smtClean="0"/>
+              <a:t>/</a:t>
+            </a:r>
+            <a:br>
+              <a:rPr lang="en-US" sz="1100" dirty="0" smtClean="0"/>
+            </a:br>
+            <a:r>
+              <a:rPr lang="en-US" sz="1100" dirty="0" smtClean="0"/>
+              <a:t>Facebook </a:t>
+            </a:r>
+            <a:r>
+              <a:rPr lang="en-US" sz="1100" dirty="0"/>
+              <a:t>Software </a:t>
+            </a:r>
+            <a:r>
+              <a:rPr lang="en-US" sz="1100" dirty="0" smtClean="0"/>
+              <a:t>Engineer</a:t>
+            </a:r>
+            <a:r>
+              <a:rPr lang="en-US" sz="1100" dirty="0"/>
+              <a:t>, Christopher </a:t>
+            </a:r>
+            <a:r>
+              <a:rPr lang="en-US" sz="1100" dirty="0" err="1" smtClean="0"/>
+              <a:t>Chedeau</a:t>
+            </a:r>
+            <a:endParaRPr lang="en-US" sz="1100" dirty="0"/>
+          </a:p>
+        </p:txBody>
+      </p:sp>
+    </p:spTree>
+    <p:extLst>
+      <p:ext uri="{BB962C8B-B14F-4D97-AF65-F5344CB8AC3E}">
+        <p14:creationId xmlns:p14="http://schemas.microsoft.com/office/powerpoint/2010/main" val="3209545674"/>
+      </p:ext>
+    </p:extLst>
+  </p:cSld>
+  <p:clrMapOvr>
+    <a:masterClrMapping/>
+  </p:clrMapOvr>
+</p:sld>
+</file>
+
+<file path=ppt/slides/slide16.xml><?xml version="1.0" encoding="utf-8"?>
+<p:sld xmlns:a="http://schemas.openxmlformats.org/drawingml/2006/main" xmlns:r="http://schemas.openxmlformats.org/officeDocument/2006/relationships" xmlns:p="http://schemas.openxmlformats.org/presentationml/2006/main">
+  <p:cSld>
+    <p:spTree>
+      <p:nvGrpSpPr>
+        <p:cNvPr id="1" name=""/>
+        <p:cNvGrpSpPr/>
+        <p:nvPr/>
+      </p:nvGrpSpPr>
+      <p:grpSpPr>
+        <a:xfrm>
+          <a:off x="0" y="0"/>
+          <a:ext cx="0" cy="0"/>
+          <a:chOff x="0" y="0"/>
+          <a:chExt cx="0" cy="0"/>
+        </a:xfrm>
+      </p:grpSpPr>
+      <p:sp>
+        <p:nvSpPr>
+          <p:cNvPr id="2" name="Title 1"/>
+          <p:cNvSpPr>
+            <a:spLocks noGrp="1"/>
+          </p:cNvSpPr>
+          <p:nvPr>
+            <p:ph type="title"/>
+          </p:nvPr>
+        </p:nvSpPr>
+        <p:spPr/>
+        <p:txBody>
+          <a:bodyPr/>
+          <a:lstStyle/>
+          <a:p>
+            <a:r>
+              <a:rPr lang="en-US" dirty="0" smtClean="0"/>
+              <a:t>Why Flux and React?</a:t>
+            </a:r>
+            <a:endParaRPr lang="en-US" dirty="0"/>
+          </a:p>
+        </p:txBody>
+      </p:sp>
+      <p:sp>
+        <p:nvSpPr>
+          <p:cNvPr id="3" name="Content Placeholder 2"/>
+          <p:cNvSpPr>
+            <a:spLocks noGrp="1"/>
+          </p:cNvSpPr>
+          <p:nvPr>
+            <p:ph idx="1"/>
+          </p:nvPr>
+        </p:nvSpPr>
+        <p:spPr/>
+        <p:txBody>
+          <a:bodyPr/>
+          <a:lstStyle/>
+          <a:p>
+            <a:r>
+              <a:rPr lang="en-US" dirty="0" smtClean="0"/>
+              <a:t>Small simple components </a:t>
+            </a:r>
+            <a:r>
+              <a:rPr lang="en-US" dirty="0"/>
+              <a:t>can be </a:t>
+            </a:r>
+            <a:r>
+              <a:rPr lang="en-US" dirty="0" smtClean="0"/>
+              <a:t>easily reused throughout the application</a:t>
+            </a:r>
+          </a:p>
+          <a:p>
+            <a:r>
+              <a:rPr lang="en-US" dirty="0" smtClean="0"/>
+              <a:t>Components combined together </a:t>
+            </a:r>
+            <a:r>
+              <a:rPr lang="en-US" dirty="0"/>
+              <a:t>to create </a:t>
+            </a:r>
+            <a:r>
+              <a:rPr lang="en-US" dirty="0" smtClean="0"/>
+              <a:t>more </a:t>
+            </a:r>
+            <a:r>
+              <a:rPr lang="en-US" dirty="0"/>
+              <a:t>complex </a:t>
+            </a:r>
+            <a:r>
+              <a:rPr lang="en-US" dirty="0" smtClean="0"/>
+              <a:t>interfaces</a:t>
+            </a:r>
+            <a:endParaRPr lang="en-US" dirty="0"/>
+          </a:p>
+          <a:p>
+            <a:r>
+              <a:rPr lang="en-US" dirty="0"/>
+              <a:t>React will automatically manage all UI updates when your underlying data </a:t>
+            </a:r>
+            <a:r>
+              <a:rPr lang="en-US" dirty="0" smtClean="0"/>
+              <a:t>changes</a:t>
+            </a:r>
+            <a:endParaRPr lang="en-US" dirty="0"/>
+          </a:p>
+          <a:p>
+            <a:r>
+              <a:rPr lang="en-US" dirty="0" smtClean="0"/>
+              <a:t>Page markup </a:t>
+            </a:r>
+            <a:r>
+              <a:rPr lang="en-US" dirty="0"/>
+              <a:t>and JavaScript behavior are defined together in the same </a:t>
+            </a:r>
+            <a:r>
+              <a:rPr lang="en-US" dirty="0" smtClean="0"/>
+              <a:t>file, the JSX format</a:t>
+            </a:r>
+          </a:p>
+          <a:p>
+            <a:r>
+              <a:rPr lang="en-US" dirty="0" smtClean="0"/>
+              <a:t>Designed for performance with large complex web applications</a:t>
+            </a:r>
+          </a:p>
+          <a:p>
+            <a:r>
+              <a:rPr lang="en-US" dirty="0" smtClean="0"/>
+              <a:t>Used by industry leaders such as Facebook, Instagram</a:t>
+            </a:r>
+            <a:r>
+              <a:rPr lang="en-US" dirty="0"/>
+              <a:t>, Netflix, </a:t>
+            </a:r>
+            <a:r>
+              <a:rPr lang="en-US" dirty="0" err="1" smtClean="0"/>
+              <a:t>Codecademy</a:t>
+            </a:r>
+            <a:endParaRPr lang="en-US" dirty="0"/>
+          </a:p>
+          <a:p>
+            <a:endParaRPr lang="en-US" dirty="0" smtClean="0"/>
+          </a:p>
+          <a:p>
+            <a:endParaRPr lang="en-US" dirty="0"/>
+          </a:p>
+        </p:txBody>
+      </p:sp>
+    </p:spTree>
+    <p:extLst>
+      <p:ext uri="{BB962C8B-B14F-4D97-AF65-F5344CB8AC3E}">
+        <p14:creationId xmlns:p14="http://schemas.microsoft.com/office/powerpoint/2010/main" val="2271870793"/>
+      </p:ext>
+    </p:extLst>
+  </p:cSld>
+  <p:clrMapOvr>
+    <a:masterClrMapping/>
+  </p:clrMapOvr>
+</p:sld>
+</file>
+
+<file path=ppt/slides/slide17.xml><?xml version="1.0" encoding="utf-8"?>
+<p:sld xmlns:a="http://schemas.openxmlformats.org/drawingml/2006/main" xmlns:r="http://schemas.openxmlformats.org/officeDocument/2006/relationships" xmlns:p="http://schemas.openxmlformats.org/presentationml/2006/main">
+  <p:cSld>
+    <p:spTree>
+      <p:nvGrpSpPr>
+        <p:cNvPr id="1" name=""/>
+        <p:cNvGrpSpPr/>
+        <p:nvPr/>
+      </p:nvGrpSpPr>
+      <p:grpSpPr>
+        <a:xfrm>
+          <a:off x="0" y="0"/>
+          <a:ext cx="0" cy="0"/>
+          <a:chOff x="0" y="0"/>
+          <a:chExt cx="0" cy="0"/>
+        </a:xfrm>
+      </p:grpSpPr>
+      <p:sp>
+        <p:nvSpPr>
+          <p:cNvPr id="2" name="Title 1"/>
+          <p:cNvSpPr>
+            <a:spLocks noGrp="1"/>
+          </p:cNvSpPr>
+          <p:nvPr>
+            <p:ph type="title"/>
+          </p:nvPr>
+        </p:nvSpPr>
+        <p:spPr/>
+        <p:txBody>
+          <a:bodyPr/>
+          <a:lstStyle/>
+          <a:p>
+            <a:r>
+              <a:rPr lang="en-US" dirty="0" smtClean="0"/>
+              <a:t>Example Code and Resources</a:t>
+            </a:r>
+            <a:endParaRPr lang="en-US" dirty="0"/>
+          </a:p>
+        </p:txBody>
+      </p:sp>
+      <p:sp>
+        <p:nvSpPr>
+          <p:cNvPr id="3" name="Content Placeholder 2"/>
+          <p:cNvSpPr>
+            <a:spLocks noGrp="1"/>
+          </p:cNvSpPr>
+          <p:nvPr>
+            <p:ph idx="1"/>
+          </p:nvPr>
+        </p:nvSpPr>
+        <p:spPr/>
+        <p:txBody>
+          <a:bodyPr/>
+          <a:lstStyle/>
+          <a:p>
+            <a:r>
+              <a:rPr lang="en-US" dirty="0" smtClean="0">
+                <a:hlinkClick r:id="rId2"/>
+              </a:rPr>
+              <a:t>https</a:t>
+            </a:r>
+            <a:r>
+              <a:rPr lang="en-US" dirty="0">
+                <a:hlinkClick r:id="rId2"/>
+              </a:rPr>
+              <a:t>://</a:t>
+            </a:r>
+            <a:r>
+              <a:rPr lang="en-US" dirty="0" smtClean="0">
+                <a:hlinkClick r:id="rId2"/>
+              </a:rPr>
+              <a:t>github.com/repkam09/react-flux-test</a:t>
+            </a:r>
+            <a:endParaRPr lang="en-US" dirty="0" smtClean="0"/>
+          </a:p>
+          <a:p>
+            <a:pPr lvl="1"/>
+            <a:r>
+              <a:rPr lang="en-US" dirty="0" smtClean="0"/>
+              <a:t>Contains all code shown in this presentation</a:t>
+            </a:r>
+          </a:p>
+          <a:p>
+            <a:r>
+              <a:rPr lang="en-US" dirty="0">
+                <a:hlinkClick r:id="rId3"/>
+              </a:rPr>
+              <a:t>http://facebook.github.io/flux</a:t>
+            </a:r>
+            <a:r>
+              <a:rPr lang="en-US" dirty="0" smtClean="0">
+                <a:hlinkClick r:id="rId3"/>
+              </a:rPr>
+              <a:t>/</a:t>
+            </a:r>
+            <a:endParaRPr lang="en-US" dirty="0" smtClean="0"/>
+          </a:p>
+          <a:p>
+            <a:pPr lvl="1"/>
+            <a:r>
+              <a:rPr lang="en-US" dirty="0" smtClean="0"/>
+              <a:t>The official documentation for Flux, provided by Facebook.</a:t>
+            </a:r>
+          </a:p>
+          <a:p>
+            <a:r>
+              <a:rPr lang="en-US" dirty="0">
+                <a:hlinkClick r:id="rId4"/>
+              </a:rPr>
+              <a:t>https://facebook.github.io/react</a:t>
+            </a:r>
+            <a:r>
+              <a:rPr lang="en-US" dirty="0" smtClean="0">
+                <a:hlinkClick r:id="rId4"/>
+              </a:rPr>
+              <a:t>/</a:t>
+            </a:r>
+            <a:endParaRPr lang="en-US" dirty="0" smtClean="0"/>
+          </a:p>
+          <a:p>
+            <a:pPr lvl="1"/>
+            <a:r>
+              <a:rPr lang="en-US" dirty="0"/>
+              <a:t>The official documentation for </a:t>
+            </a:r>
+            <a:r>
+              <a:rPr lang="en-US" dirty="0" smtClean="0"/>
+              <a:t>React, </a:t>
+            </a:r>
+            <a:r>
+              <a:rPr lang="en-US" dirty="0"/>
+              <a:t>provided by Facebook</a:t>
+            </a:r>
+            <a:r>
+              <a:rPr lang="en-US" dirty="0" smtClean="0"/>
+              <a:t>.</a:t>
+            </a:r>
+          </a:p>
+          <a:p>
+            <a:endParaRPr lang="en-US" dirty="0"/>
+          </a:p>
+        </p:txBody>
+      </p:sp>
+    </p:spTree>
+    <p:extLst>
+      <p:ext uri="{BB962C8B-B14F-4D97-AF65-F5344CB8AC3E}">
+        <p14:creationId xmlns:p14="http://schemas.microsoft.com/office/powerpoint/2010/main" val="1864606522"/>
+      </p:ext>
+    </p:extLst>
+  </p:cSld>
+  <p:clrMapOvr>
+    <a:masterClrMapping/>
+  </p:clrMapOvr>
+</p:sld>
+</file>
+
+<file path=ppt/slides/slide2.xml><?xml version="1.0" encoding="utf-8"?>
+<p:sld xmlns:a="http://schemas.openxmlformats.org/drawingml/2006/main" xmlns:r="http://schemas.openxmlformats.org/officeDocument/2006/relationships" xmlns:p="http://schemas.openxmlformats.org/presentationml/2006/main">
+  <p:cSld>
+    <p:spTree>
+      <p:nvGrpSpPr>
+        <p:cNvPr id="1" name=""/>
+        <p:cNvGrpSpPr/>
+        <p:nvPr/>
+      </p:nvGrpSpPr>
+      <p:grpSpPr>
+        <a:xfrm>
+          <a:off x="0" y="0"/>
+          <a:ext cx="0" cy="0"/>
+          <a:chOff x="0" y="0"/>
+          <a:chExt cx="0" cy="0"/>
+        </a:xfrm>
+      </p:grpSpPr>
+      <p:sp>
+        <p:nvSpPr>
+          <p:cNvPr id="2" name="Title 1"/>
+          <p:cNvSpPr>
+            <a:spLocks noGrp="1"/>
+          </p:cNvSpPr>
+          <p:nvPr>
+            <p:ph type="title"/>
+          </p:nvPr>
+        </p:nvSpPr>
+        <p:spPr/>
+        <p:txBody>
+          <a:bodyPr/>
+          <a:lstStyle/>
+          <a:p>
+            <a:r>
+              <a:rPr lang="en-US" dirty="0" smtClean="0"/>
+              <a:t>Introduction to Web Development</a:t>
+            </a:r>
+            <a:endParaRPr lang="en-US" dirty="0"/>
+          </a:p>
+        </p:txBody>
+      </p:sp>
+      <p:sp>
+        <p:nvSpPr>
+          <p:cNvPr id="3" name="Content Placeholder 2"/>
+          <p:cNvSpPr>
+            <a:spLocks noGrp="1"/>
+          </p:cNvSpPr>
+          <p:nvPr>
+            <p:ph idx="1"/>
+          </p:nvPr>
+        </p:nvSpPr>
+        <p:spPr/>
+        <p:txBody>
+          <a:bodyPr>
+            <a:normAutofit lnSpcReduction="10000"/>
+          </a:bodyPr>
+          <a:lstStyle/>
+          <a:p>
+            <a:r>
+              <a:rPr lang="en-US" dirty="0" err="1"/>
+              <a:t>HyperText</a:t>
+            </a:r>
+            <a:r>
+              <a:rPr lang="en-US" dirty="0"/>
+              <a:t> Markup </a:t>
+            </a:r>
+            <a:r>
+              <a:rPr lang="en-US" dirty="0" smtClean="0"/>
+              <a:t>Language (HTML)</a:t>
+            </a:r>
+          </a:p>
+          <a:p>
+            <a:pPr lvl="1"/>
+            <a:r>
+              <a:rPr lang="en-US" dirty="0" smtClean="0"/>
+              <a:t>The </a:t>
+            </a:r>
+            <a:r>
+              <a:rPr lang="en-US" dirty="0"/>
+              <a:t>standard markup language used to create web </a:t>
+            </a:r>
+            <a:r>
+              <a:rPr lang="en-US" dirty="0" smtClean="0"/>
+              <a:t>pages</a:t>
+            </a:r>
+          </a:p>
+          <a:p>
+            <a:pPr lvl="1"/>
+            <a:r>
+              <a:rPr lang="en-US" dirty="0" smtClean="0"/>
+              <a:t>Consists of </a:t>
+            </a:r>
+            <a:r>
+              <a:rPr lang="en-US" dirty="0"/>
+              <a:t>tags enclosed in angle </a:t>
+            </a:r>
+            <a:r>
+              <a:rPr lang="en-US" dirty="0" smtClean="0"/>
+              <a:t>brackets:  &lt;html&gt;something&lt;/html&gt;</a:t>
+            </a:r>
+            <a:endParaRPr lang="en-US" dirty="0"/>
+          </a:p>
+          <a:p>
+            <a:endParaRPr lang="en-US" dirty="0" smtClean="0"/>
+          </a:p>
+          <a:p>
+            <a:r>
+              <a:rPr lang="en-US" dirty="0"/>
+              <a:t>Cascading Style </a:t>
+            </a:r>
+            <a:r>
+              <a:rPr lang="en-US" dirty="0" smtClean="0"/>
+              <a:t>Sheets (CSS)</a:t>
+            </a:r>
+          </a:p>
+          <a:p>
+            <a:pPr lvl="1"/>
+            <a:r>
+              <a:rPr lang="en-US" dirty="0" smtClean="0"/>
+              <a:t>The standard style </a:t>
+            </a:r>
+            <a:r>
+              <a:rPr lang="en-US" dirty="0"/>
+              <a:t>sheet language used for describing the look and formatting of a document written in a markup </a:t>
+            </a:r>
+            <a:r>
+              <a:rPr lang="en-US" dirty="0" smtClean="0"/>
+              <a:t>language, usually HTML.</a:t>
+            </a:r>
+          </a:p>
+          <a:p>
+            <a:pPr lvl="1"/>
+            <a:r>
+              <a:rPr lang="en-US" dirty="0" smtClean="0"/>
+              <a:t>Uses a JSON-like structure to define classes and attributes for each HTML tag</a:t>
+            </a:r>
+          </a:p>
+          <a:p>
+            <a:endParaRPr lang="en-US" dirty="0"/>
+          </a:p>
+          <a:p>
+            <a:r>
+              <a:rPr lang="en-US" dirty="0" smtClean="0"/>
+              <a:t>JavaScript (JS)</a:t>
+            </a:r>
+          </a:p>
+          <a:p>
+            <a:pPr lvl="1"/>
+            <a:r>
+              <a:rPr lang="en-US" dirty="0"/>
+              <a:t>Also known </a:t>
+            </a:r>
+            <a:r>
+              <a:rPr lang="en-US" dirty="0" smtClean="0"/>
+              <a:t>as ECMAScript</a:t>
+            </a:r>
+          </a:p>
+          <a:p>
+            <a:pPr lvl="1"/>
+            <a:r>
+              <a:rPr lang="en-US" dirty="0"/>
+              <a:t>P</a:t>
+            </a:r>
+            <a:r>
+              <a:rPr lang="en-US" dirty="0" smtClean="0"/>
+              <a:t>rogramming </a:t>
+            </a:r>
+            <a:r>
+              <a:rPr lang="en-US" dirty="0"/>
+              <a:t>language of HTML and the </a:t>
+            </a:r>
+            <a:r>
+              <a:rPr lang="en-US" dirty="0" smtClean="0"/>
+              <a:t>Web</a:t>
+            </a:r>
+          </a:p>
+          <a:p>
+            <a:pPr lvl="1"/>
+            <a:r>
+              <a:rPr lang="en-US" dirty="0" smtClean="0"/>
+              <a:t>Enables many more dynamic features of websites and web applications</a:t>
+            </a:r>
+            <a:endParaRPr lang="en-US" dirty="0"/>
+          </a:p>
+          <a:p>
+            <a:endParaRPr lang="en-US" dirty="0"/>
+          </a:p>
+        </p:txBody>
+      </p:sp>
+    </p:spTree>
+    <p:extLst>
+      <p:ext uri="{BB962C8B-B14F-4D97-AF65-F5344CB8AC3E}">
+        <p14:creationId xmlns:p14="http://schemas.microsoft.com/office/powerpoint/2010/main" val="183866939"/>
+      </p:ext>
+    </p:extLst>
+  </p:cSld>
+  <p:clrMapOvr>
+    <a:masterClrMapping/>
+  </p:clrMapOvr>
+  <p:timing>
+    <p:tnLst>
+      <p:par>
+        <p:cTn id="1" dur="indefinite" restart="never" nodeType="tmRoot"/>
+      </p:par>
+    </p:tnLst>
+  </p:timing>
+</p:sld>
+</file>
+
+<file path=ppt/slides/slide3.xml><?xml version="1.0" encoding="utf-8"?>
+<p:sld xmlns:a="http://schemas.openxmlformats.org/drawingml/2006/main" xmlns:r="http://schemas.openxmlformats.org/officeDocument/2006/relationships" xmlns:p="http://schemas.openxmlformats.org/presentationml/2006/main">
+  <p:cSld>
+    <p:spTree>
+      <p:nvGrpSpPr>
+        <p:cNvPr id="1" name=""/>
+        <p:cNvGrpSpPr/>
+        <p:nvPr/>
+      </p:nvGrpSpPr>
+      <p:grpSpPr>
+        <a:xfrm>
+          <a:off x="0" y="0"/>
+          <a:ext cx="0" cy="0"/>
+          <a:chOff x="0" y="0"/>
+          <a:chExt cx="0" cy="0"/>
+        </a:xfrm>
+      </p:grpSpPr>
+      <p:sp>
+        <p:nvSpPr>
+          <p:cNvPr id="4" name="Title 3"/>
+          <p:cNvSpPr>
+            <a:spLocks noGrp="1"/>
+          </p:cNvSpPr>
+          <p:nvPr>
+            <p:ph type="title"/>
+          </p:nvPr>
+        </p:nvSpPr>
+        <p:spPr/>
+        <p:txBody>
+          <a:bodyPr/>
+          <a:lstStyle/>
+          <a:p>
+            <a:r>
+              <a:rPr lang="en-US" dirty="0">
+                <a:solidFill>
+                  <a:srgbClr val="318435"/>
+                </a:solidFill>
+                <a:effectLst>
+                  <a:outerShdw blurRad="38100" dist="38100" dir="2700000" algn="tl">
+                    <a:srgbClr val="000000">
+                      <a:alpha val="43137"/>
+                    </a:srgbClr>
+                  </a:outerShdw>
+                </a:effectLst>
+              </a:rPr>
+              <a:t>Flux</a:t>
+            </a:r>
+            <a:endParaRPr lang="en-US" dirty="0">
+              <a:effectLst>
+                <a:outerShdw blurRad="38100" dist="38100" dir="2700000" algn="tl">
+                  <a:srgbClr val="000000">
+                    <a:alpha val="43137"/>
+                  </a:srgbClr>
+                </a:outerShdw>
+              </a:effectLst>
+            </a:endParaRPr>
+          </a:p>
+        </p:txBody>
+      </p:sp>
+      <p:sp>
+        <p:nvSpPr>
+          <p:cNvPr id="10" name="Text Placeholder 9"/>
+          <p:cNvSpPr>
+            <a:spLocks noGrp="1"/>
+          </p:cNvSpPr>
+          <p:nvPr>
+            <p:ph type="body" idx="1"/>
+          </p:nvPr>
+        </p:nvSpPr>
+        <p:spPr/>
+        <p:txBody>
+          <a:bodyPr/>
+          <a:lstStyle/>
+          <a:p>
+            <a:r>
+              <a:rPr lang="en-US" dirty="0" smtClean="0"/>
+              <a:t>An architecture for building</a:t>
+            </a:r>
+            <a:br>
+              <a:rPr lang="en-US" dirty="0" smtClean="0"/>
+            </a:br>
+            <a:r>
+              <a:rPr lang="en-US" dirty="0" smtClean="0"/>
+              <a:t>client-side web </a:t>
+            </a:r>
+            <a:r>
+              <a:rPr lang="en-US" dirty="0"/>
+              <a:t>applications</a:t>
+            </a:r>
+          </a:p>
+        </p:txBody>
+      </p:sp>
+      <p:pic>
+        <p:nvPicPr>
+          <p:cNvPr id="2" name="Picture 1"/>
+          <p:cNvPicPr>
+            <a:picLocks noChangeAspect="1"/>
+          </p:cNvPicPr>
+          <p:nvPr/>
+        </p:nvPicPr>
+        <p:blipFill>
+          <a:blip r:embed="rId2">
+            <a:extLst>
+              <a:ext uri="{28A0092B-C50C-407E-A947-70E740481C1C}">
+                <a14:useLocalDpi xmlns:a14="http://schemas.microsoft.com/office/drawing/2010/main" val="0"/>
+              </a:ext>
+            </a:extLst>
+          </a:blip>
+          <a:stretch>
+            <a:fillRect/>
+          </a:stretch>
+        </p:blipFill>
+        <p:spPr>
+          <a:xfrm>
+            <a:off x="3676072" y="3521363"/>
+            <a:ext cx="1561209" cy="1561209"/>
+          </a:xfrm>
+          <a:prstGeom prst="rect">
+            <a:avLst/>
+          </a:prstGeom>
+        </p:spPr>
+      </p:pic>
+    </p:spTree>
+    <p:extLst>
+      <p:ext uri="{BB962C8B-B14F-4D97-AF65-F5344CB8AC3E}">
+        <p14:creationId xmlns:p14="http://schemas.microsoft.com/office/powerpoint/2010/main" val="2278960357"/>
+      </p:ext>
+    </p:extLst>
+  </p:cSld>
+  <p:clrMapOvr>
+    <a:masterClrMapping/>
+  </p:clrMapOvr>
+  <p:timing>
+    <p:tnLst>
+      <p:par>
+        <p:cTn id="1" dur="indefinite" restart="never" nodeType="tmRoot"/>
+      </p:par>
+    </p:tnLst>
+  </p:timing>
+</p:sld>
+</file>
+
+<file path=ppt/slides/slide4.xml><?xml version="1.0" encoding="utf-8"?>
+<p:sld xmlns:a="http://schemas.openxmlformats.org/drawingml/2006/main" xmlns:r="http://schemas.openxmlformats.org/officeDocument/2006/relationships" xmlns:p="http://schemas.openxmlformats.org/presentationml/2006/main">
+  <p:cSld>
+    <p:spTree>
+      <p:nvGrpSpPr>
+        <p:cNvPr id="1" name=""/>
+        <p:cNvGrpSpPr/>
+        <p:nvPr/>
+      </p:nvGrpSpPr>
+      <p:grpSpPr>
+        <a:xfrm>
+          <a:off x="0" y="0"/>
+          <a:ext cx="0" cy="0"/>
+          <a:chOff x="0" y="0"/>
+          <a:chExt cx="0" cy="0"/>
+        </a:xfrm>
+      </p:grpSpPr>
+      <p:sp>
+        <p:nvSpPr>
           <p:cNvPr id="4" name="Title 3"/>
           <p:cNvSpPr>
             <a:spLocks noGrp="1"/>
@@ -3675,7 +5514,9 @@
           </a:xfrm>
         </p:spPr>
         <p:txBody>
-          <a:bodyPr/>
+          <a:bodyPr>
+            <a:normAutofit fontScale="92500" lnSpcReduction="10000"/>
+          </a:bodyPr>
           <a:lstStyle/>
           <a:p>
             <a:r>
@@ -3762,8 +5603,17 @@
             </a:r>
           </a:p>
           <a:p>
-            <a:pPr lvl="1"/>
-            <a:endParaRPr lang="en-US" dirty="0" smtClean="0"/>
+            <a:r>
+              <a:rPr lang="en-US" dirty="0" smtClean="0"/>
+              <a:t>Designed by Facebook and Instagram</a:t>
+            </a:r>
+            <a:endParaRPr lang="en-US" dirty="0"/>
+          </a:p>
+          <a:p>
+            <a:r>
+              <a:rPr lang="en-US" dirty="0" smtClean="0"/>
+              <a:t>Provided as Open Source software</a:t>
+            </a:r>
           </a:p>
         </p:txBody>
       </p:sp>
@@ -3964,7 +5814,7 @@
 </p:sld>
 </file>
 
-<file path=ppt/slides/slide11.xml><?xml version="1.0" encoding="utf-8"?>
+<file path=ppt/slides/slide5.xml><?xml version="1.0" encoding="utf-8"?>
 <p:sld xmlns:a="http://schemas.openxmlformats.org/drawingml/2006/main" xmlns:r="http://schemas.openxmlformats.org/officeDocument/2006/relationships" xmlns:p="http://schemas.openxmlformats.org/presentationml/2006/main">
   <p:cSld>
     <p:spTree>
@@ -4092,13 +5942,8 @@
             </a:r>
             <a:r>
               <a:rPr lang="en-US" dirty="0" smtClean="0"/>
-              <a:t>callbacks and can choose to act on </a:t>
-            </a:r>
-            <a:r>
-              <a:rPr lang="en-US" dirty="0" smtClean="0"/>
-              <a:t>them</a:t>
-            </a:r>
-            <a:endParaRPr lang="en-US" dirty="0" smtClean="0"/>
+              <a:t>callbacks and can choose to act on them</a:t>
+            </a:r>
           </a:p>
         </p:txBody>
       </p:sp>
@@ -4151,7 +5996,6 @@
               <a:rPr lang="en-US" i="1" dirty="0"/>
               <a:t>Facebook, the creators of Flux, provide code for an example Dispatcher to get started. This is seen in the require(‘flux’).Dispatcher statement in the code to the right.</a:t>
             </a:r>
-            <a:endParaRPr lang="en-US" i="1" dirty="0"/>
           </a:p>
         </p:txBody>
       </p:sp>
@@ -4175,7 +6019,7 @@
 </p:sld>
 </file>
 
-<file path=ppt/slides/slide12.xml><?xml version="1.0" encoding="utf-8"?>
+<file path=ppt/slides/slide6.xml><?xml version="1.0" encoding="utf-8"?>
 <p:sld xmlns:a="http://schemas.openxmlformats.org/drawingml/2006/main" xmlns:r="http://schemas.openxmlformats.org/officeDocument/2006/relationships" xmlns:p="http://schemas.openxmlformats.org/presentationml/2006/main">
   <p:cSld>
     <p:spTree>
@@ -4214,11 +6058,7 @@
           <a:p>
             <a:r>
               <a:rPr lang="en-US" dirty="0" smtClean="0"/>
-              <a:t>Flux: </a:t>
-            </a:r>
-            <a:r>
-              <a:rPr lang="en-US" dirty="0" smtClean="0"/>
-              <a:t>Stores</a:t>
+              <a:t>Flux: Stores</a:t>
             </a:r>
             <a:endParaRPr lang="en-US" dirty="0"/>
           </a:p>
@@ -4261,11 +6101,19 @@
             </a:r>
             <a:r>
               <a:rPr lang="en-US" dirty="0"/>
-              <a:t>to a model in a traditional </a:t>
-            </a:r>
-            <a:r>
-              <a:rPr lang="en-US" dirty="0" smtClean="0"/>
-              <a:t>MVC</a:t>
+              <a:t>to </a:t>
+            </a:r>
+            <a:r>
+              <a:rPr lang="en-US" dirty="0" smtClean="0"/>
+              <a:t>the model and controller </a:t>
+            </a:r>
+            <a:r>
+              <a:rPr lang="en-US" dirty="0"/>
+              <a:t>in a traditional </a:t>
+            </a:r>
+            <a:r>
+              <a:rPr lang="en-US" dirty="0" smtClean="0"/>
+              <a:t>MVC application</a:t>
             </a:r>
           </a:p>
           <a:p>
@@ -4286,6 +6134,12 @@
             <a:r>
               <a:rPr lang="en-US" dirty="0" smtClean="0"/>
               <a:t>Contains a switch statement that can decide what to do with various actions that are dispatched by the Dispatcher</a:t>
+            </a:r>
+          </a:p>
+          <a:p>
+            <a:r>
+              <a:rPr lang="en-US" dirty="0" smtClean="0"/>
+              <a:t>Emits Events to any listening Views telling them to update their internal state</a:t>
             </a:r>
           </a:p>
           <a:p>
@@ -4340,7 +6194,7 @@
 </p:sld>
 </file>
 
-<file path=ppt/slides/slide2.xml><?xml version="1.0" encoding="utf-8"?>
+<file path=ppt/slides/slide7.xml><?xml version="1.0" encoding="utf-8"?>
 <p:sld xmlns:a="http://schemas.openxmlformats.org/drawingml/2006/main" xmlns:r="http://schemas.openxmlformats.org/officeDocument/2006/relationships" xmlns:p="http://schemas.openxmlformats.org/presentationml/2006/main">
   <p:cSld>
     <p:spTree>
@@ -4359,7 +6213,7 @@
       </p:grpSpPr>
       <p:sp>
         <p:nvSpPr>
-          <p:cNvPr id="2" name="Title 1"/>
+          <p:cNvPr id="5" name="Title 4"/>
           <p:cNvSpPr>
             <a:spLocks noGrp="1"/>
           </p:cNvSpPr>
@@ -4367,22 +6221,27 @@
             <p:ph type="title"/>
           </p:nvPr>
         </p:nvSpPr>
-        <p:spPr/>
-        <p:txBody>
-          <a:bodyPr/>
-          <a:lstStyle/>
-          <a:p>
-            <a:r>
-              <a:rPr lang="en-US" dirty="0" smtClean="0"/>
-              <a:t>Introduction to Web Development</a:t>
-            </a:r>
-            <a:endParaRPr lang="en-US" dirty="0"/>
-          </a:p>
-        </p:txBody>
-      </p:sp>
-      <p:sp>
-        <p:nvSpPr>
-          <p:cNvPr id="3" name="Content Placeholder 2"/>
+        <p:spPr>
+          <a:xfrm>
+            <a:off x="375181" y="365760"/>
+            <a:ext cx="9692640" cy="1325562"/>
+          </a:xfrm>
+        </p:spPr>
+        <p:txBody>
+          <a:bodyPr/>
+          <a:lstStyle/>
+          <a:p>
+            <a:r>
+              <a:rPr lang="en-US" dirty="0" smtClean="0"/>
+              <a:t>Flux: Views</a:t>
+            </a:r>
+            <a:endParaRPr lang="en-US" dirty="0"/>
+          </a:p>
+        </p:txBody>
+      </p:sp>
+      <p:sp>
+        <p:nvSpPr>
+          <p:cNvPr id="6" name="Content Placeholder 5"/>
           <p:cNvSpPr>
             <a:spLocks noGrp="1"/>
           </p:cNvSpPr>
@@ -4390,237 +6249,78 @@
             <p:ph idx="1"/>
           </p:nvPr>
         </p:nvSpPr>
-        <p:spPr/>
+        <p:spPr>
+          <a:xfrm>
+            <a:off x="513726" y="1791855"/>
+            <a:ext cx="5933255" cy="2992582"/>
+          </a:xfrm>
+        </p:spPr>
         <p:txBody>
           <a:bodyPr>
-            <a:normAutofit lnSpcReduction="10000"/>
+            <a:normAutofit/>
           </a:bodyPr>
           <a:lstStyle/>
           <a:p>
             <a:r>
+              <a:rPr lang="en-US" dirty="0" smtClean="0"/>
+              <a:t>Flux was designed to pair well with the React library which provides the UI side of your web application</a:t>
+            </a:r>
+          </a:p>
+          <a:p>
+            <a:r>
+              <a:rPr lang="en-US" dirty="0" smtClean="0"/>
+              <a:t>When an action is captured by the store an event is emitted to any view that is listening to that store.</a:t>
+            </a:r>
+            <a:endParaRPr lang="en-US" dirty="0"/>
+          </a:p>
+          <a:p>
+            <a:r>
+              <a:rPr lang="en-US" dirty="0" smtClean="0"/>
+              <a:t>The view calls </a:t>
+            </a:r>
+            <a:r>
+              <a:rPr lang="en-US" dirty="0"/>
+              <a:t>its own </a:t>
+            </a:r>
+            <a:r>
               <a:rPr lang="en-US" dirty="0" err="1"/>
-              <a:t>HyperText</a:t>
+              <a:t>setState</a:t>
+            </a:r>
+            <a:r>
+              <a:rPr lang="en-US" dirty="0" smtClean="0"/>
+              <a:t>( ) </a:t>
             </a:r>
             <a:r>
               <a:rPr lang="en-US" dirty="0"/>
-              <a:t> Markup </a:t>
-            </a:r>
-            <a:r>
-              <a:rPr lang="en-US" dirty="0" smtClean="0"/>
-              <a:t>Language (HTML)</a:t>
+              <a:t>or </a:t>
+            </a:r>
+            <a:r>
+              <a:rPr lang="en-US" dirty="0" err="1"/>
+              <a:t>forceUpdate</a:t>
+            </a:r>
+            <a:r>
+              <a:rPr lang="en-US" dirty="0" smtClean="0"/>
+              <a:t>( ) methods to update accordingly</a:t>
             </a:r>
           </a:p>
           <a:p>
             <a:pPr lvl="1"/>
             <a:r>
               <a:rPr lang="en-US" dirty="0" smtClean="0"/>
-              <a:t>The </a:t>
-            </a:r>
-            <a:r>
-              <a:rPr lang="en-US" dirty="0"/>
-              <a:t>standard markup language used to create web </a:t>
-            </a:r>
-            <a:r>
-              <a:rPr lang="en-US" dirty="0" smtClean="0"/>
-              <a:t>pages</a:t>
-            </a:r>
-          </a:p>
-          <a:p>
-            <a:pPr lvl="1"/>
-            <a:r>
-              <a:rPr lang="en-US" dirty="0" smtClean="0"/>
-              <a:t>Consists of </a:t>
-            </a:r>
-            <a:r>
-              <a:rPr lang="en-US" dirty="0"/>
-              <a:t>tags enclosed in angle </a:t>
-            </a:r>
-            <a:r>
-              <a:rPr lang="en-US" dirty="0" smtClean="0"/>
-              <a:t>brackets:  &lt;html&gt;something&lt;/html&gt;</a:t>
-            </a:r>
-            <a:endParaRPr lang="en-US" dirty="0"/>
+              <a:t>More on this in the React section next…</a:t>
+            </a:r>
           </a:p>
           <a:p>
             <a:endParaRPr lang="en-US" dirty="0" smtClean="0"/>
           </a:p>
           <a:p>
-            <a:r>
-              <a:rPr lang="en-US" dirty="0"/>
-              <a:t>Cascading Style </a:t>
-            </a:r>
-            <a:r>
-              <a:rPr lang="en-US" dirty="0" smtClean="0"/>
-              <a:t>Sheets (CSS)</a:t>
-            </a:r>
-          </a:p>
-          <a:p>
-            <a:pPr lvl="1"/>
-            <a:r>
-              <a:rPr lang="en-US" dirty="0" smtClean="0"/>
-              <a:t>The standard style </a:t>
-            </a:r>
-            <a:r>
-              <a:rPr lang="en-US" dirty="0"/>
-              <a:t>sheet language used for describing the look and formatting of a document written in a markup </a:t>
-            </a:r>
-            <a:r>
-              <a:rPr lang="en-US" dirty="0" smtClean="0"/>
-              <a:t>language, usually HTML.</a:t>
-            </a:r>
-          </a:p>
-          <a:p>
-            <a:pPr lvl="1"/>
-            <a:r>
-              <a:rPr lang="en-US" dirty="0" smtClean="0"/>
-              <a:t>Uses a JSON-like structure to define classes and attributes for each HTML tag</a:t>
-            </a:r>
-          </a:p>
-          <a:p>
-            <a:endParaRPr lang="en-US" dirty="0"/>
-          </a:p>
-          <a:p>
-            <a:r>
-              <a:rPr lang="en-US" dirty="0" smtClean="0"/>
-              <a:t>JavaScript (JS)</a:t>
-            </a:r>
-          </a:p>
-          <a:p>
-            <a:pPr lvl="1"/>
-            <a:r>
-              <a:rPr lang="en-US" dirty="0"/>
-              <a:t>Also known </a:t>
-            </a:r>
-            <a:r>
-              <a:rPr lang="en-US" dirty="0" smtClean="0"/>
-              <a:t>as ECMAScript</a:t>
-            </a:r>
-          </a:p>
-          <a:p>
-            <a:pPr lvl="1"/>
-            <a:r>
-              <a:rPr lang="en-US" dirty="0"/>
-              <a:t>P</a:t>
-            </a:r>
-            <a:r>
-              <a:rPr lang="en-US" dirty="0" smtClean="0"/>
-              <a:t>rogramming </a:t>
-            </a:r>
-            <a:r>
-              <a:rPr lang="en-US" dirty="0"/>
-              <a:t>language of HTML and the </a:t>
-            </a:r>
-            <a:r>
-              <a:rPr lang="en-US" dirty="0" smtClean="0"/>
-              <a:t>Web</a:t>
-            </a:r>
-          </a:p>
-          <a:p>
-            <a:pPr lvl="1"/>
-            <a:r>
-              <a:rPr lang="en-US" dirty="0" smtClean="0"/>
-              <a:t>Enables many more dynamic features of websites and web applications</a:t>
-            </a:r>
-            <a:endParaRPr lang="en-US" dirty="0"/>
-          </a:p>
-          <a:p>
-            <a:endParaRPr lang="en-US" dirty="0"/>
-          </a:p>
-        </p:txBody>
-      </p:sp>
-    </p:spTree>
-    <p:extLst>
-      <p:ext uri="{BB962C8B-B14F-4D97-AF65-F5344CB8AC3E}">
-        <p14:creationId xmlns:p14="http://schemas.microsoft.com/office/powerpoint/2010/main" val="183866939"/>
-      </p:ext>
-    </p:extLst>
-  </p:cSld>
-  <p:clrMapOvr>
-    <a:masterClrMapping/>
-  </p:clrMapOvr>
-  <p:timing>
-    <p:tnLst>
-      <p:par>
-        <p:cTn id="1" dur="indefinite" restart="never" nodeType="tmRoot"/>
-      </p:par>
-    </p:tnLst>
-  </p:timing>
-</p:sld>
-</file>
-
-<file path=ppt/slides/slide3.xml><?xml version="1.0" encoding="utf-8"?>
-<p:sld xmlns:a="http://schemas.openxmlformats.org/drawingml/2006/main" xmlns:r="http://schemas.openxmlformats.org/officeDocument/2006/relationships" xmlns:p="http://schemas.openxmlformats.org/presentationml/2006/main">
-  <p:cSld>
-    <p:spTree>
-      <p:nvGrpSpPr>
-        <p:cNvPr id="1" name=""/>
-        <p:cNvGrpSpPr/>
-        <p:nvPr/>
-      </p:nvGrpSpPr>
-      <p:grpSpPr>
-        <a:xfrm>
-          <a:off x="0" y="0"/>
-          <a:ext cx="0" cy="0"/>
-          <a:chOff x="0" y="0"/>
-          <a:chExt cx="0" cy="0"/>
-        </a:xfrm>
-      </p:grpSpPr>
-      <p:sp>
-        <p:nvSpPr>
-          <p:cNvPr id="4" name="Title 3"/>
-          <p:cNvSpPr>
-            <a:spLocks noGrp="1"/>
-          </p:cNvSpPr>
-          <p:nvPr>
-            <p:ph type="title"/>
-          </p:nvPr>
-        </p:nvSpPr>
-        <p:spPr/>
-        <p:txBody>
-          <a:bodyPr/>
-          <a:lstStyle/>
-          <a:p>
-            <a:r>
-              <a:rPr lang="en-US" dirty="0" smtClean="0"/>
-              <a:t>React</a:t>
-            </a:r>
-            <a:endParaRPr lang="en-US" dirty="0"/>
-          </a:p>
-        </p:txBody>
-      </p:sp>
-      <p:sp>
-        <p:nvSpPr>
-          <p:cNvPr id="10" name="Text Placeholder 9"/>
-          <p:cNvSpPr>
-            <a:spLocks noGrp="1"/>
-          </p:cNvSpPr>
-          <p:nvPr>
-            <p:ph type="body" idx="1"/>
-          </p:nvPr>
-        </p:nvSpPr>
-        <p:spPr/>
-        <p:txBody>
-          <a:bodyPr/>
-          <a:lstStyle/>
-          <a:p>
-            <a:r>
-              <a:rPr lang="en-US" dirty="0" smtClean="0"/>
-              <a:t>A JavaScript library for</a:t>
-            </a:r>
-            <a:br>
-              <a:rPr lang="en-US" dirty="0" smtClean="0"/>
-            </a:br>
-            <a:r>
-              <a:rPr lang="en-US" dirty="0" smtClean="0"/>
-              <a:t>building user interfaces</a:t>
-            </a:r>
             <a:endParaRPr lang="en-US" dirty="0"/>
           </a:p>
         </p:txBody>
       </p:sp>
       <p:pic>
         <p:nvPicPr>
-          <p:cNvPr id="11" name="Picture 10"/>
+          <p:cNvPr id="7" name="Picture 6"/>
           <p:cNvPicPr>
             <a:picLocks noChangeAspect="1"/>
           </p:cNvPicPr>
@@ -4640,7 +6340,7 @@
         </p:blipFill>
         <p:spPr>
           <a:xfrm>
-            <a:off x="5110572" y="3644483"/>
+            <a:off x="7844536" y="931394"/>
             <a:ext cx="1720919" cy="1720919"/>
           </a:xfrm>
           <a:prstGeom prst="rect">
@@ -4648,608 +6348,44 @@
           </a:prstGeom>
         </p:spPr>
       </p:pic>
-    </p:spTree>
-    <p:extLst>
-      <p:ext uri="{BB962C8B-B14F-4D97-AF65-F5344CB8AC3E}">
-        <p14:creationId xmlns:p14="http://schemas.microsoft.com/office/powerpoint/2010/main" val="3080495590"/>
-      </p:ext>
-    </p:extLst>
-  </p:cSld>
-  <p:clrMapOvr>
-    <a:masterClrMapping/>
-  </p:clrMapOvr>
-  <p:timing>
-    <p:tnLst>
-      <p:par>
-        <p:cTn id="1" dur="indefinite" restart="never" nodeType="tmRoot"/>
-      </p:par>
-    </p:tnLst>
-  </p:timing>
-</p:sld>
-</file>
-
-<file path=ppt/slides/slide4.xml><?xml version="1.0" encoding="utf-8"?>
-<p:sld xmlns:a="http://schemas.openxmlformats.org/drawingml/2006/main" xmlns:r="http://schemas.openxmlformats.org/officeDocument/2006/relationships" xmlns:p="http://schemas.openxmlformats.org/presentationml/2006/main">
-  <p:cSld>
-    <p:spTree>
-      <p:nvGrpSpPr>
-        <p:cNvPr id="1" name=""/>
-        <p:cNvGrpSpPr/>
-        <p:nvPr/>
-      </p:nvGrpSpPr>
-      <p:grpSpPr>
-        <a:xfrm>
-          <a:off x="0" y="0"/>
-          <a:ext cx="0" cy="0"/>
-          <a:chOff x="0" y="0"/>
-          <a:chExt cx="0" cy="0"/>
-        </a:xfrm>
-      </p:grpSpPr>
-      <p:sp>
-        <p:nvSpPr>
-          <p:cNvPr id="4" name="Title 3"/>
-          <p:cNvSpPr>
-            <a:spLocks noGrp="1"/>
-          </p:cNvSpPr>
-          <p:nvPr>
-            <p:ph type="title"/>
-          </p:nvPr>
+      <p:sp>
+        <p:nvSpPr>
+          <p:cNvPr id="8" name="Rectangle 7"/>
+          <p:cNvSpPr/>
+          <p:nvPr/>
         </p:nvSpPr>
         <p:spPr>
           <a:xfrm>
-            <a:off x="338276" y="402705"/>
-            <a:ext cx="9692640" cy="1325562"/>
-          </a:xfrm>
-        </p:spPr>
-        <p:txBody>
-          <a:bodyPr/>
-          <a:lstStyle/>
-          <a:p>
-            <a:r>
-              <a:rPr lang="en-US" dirty="0" smtClean="0"/>
-              <a:t>React Overview</a:t>
-            </a:r>
-            <a:endParaRPr lang="en-US" dirty="0"/>
-          </a:p>
-        </p:txBody>
-      </p:sp>
-      <p:sp>
-        <p:nvSpPr>
-          <p:cNvPr id="5" name="Content Placeholder 4"/>
-          <p:cNvSpPr>
-            <a:spLocks noGrp="1"/>
-          </p:cNvSpPr>
-          <p:nvPr>
-            <p:ph idx="1"/>
-          </p:nvPr>
-        </p:nvSpPr>
-        <p:spPr>
-          <a:xfrm>
-            <a:off x="279492" y="1911739"/>
-            <a:ext cx="4786366" cy="4351338"/>
-          </a:xfrm>
-        </p:spPr>
-        <p:txBody>
-          <a:bodyPr/>
-          <a:lstStyle/>
-          <a:p>
-            <a:r>
-              <a:rPr lang="en-US" dirty="0" smtClean="0"/>
-              <a:t>Just the User Interface</a:t>
-            </a:r>
-          </a:p>
-          <a:p>
-            <a:pPr lvl="1"/>
-            <a:r>
-              <a:rPr lang="en-US" dirty="0" smtClean="0"/>
-              <a:t>Handles the V in the MVC design pattern</a:t>
-            </a:r>
-          </a:p>
-          <a:p>
-            <a:r>
-              <a:rPr lang="en-US" dirty="0"/>
-              <a:t>Simple </a:t>
-            </a:r>
-            <a:r>
-              <a:rPr lang="en-US" dirty="0" smtClean="0"/>
-              <a:t>Components</a:t>
-            </a:r>
-          </a:p>
-          <a:p>
-            <a:pPr lvl="1"/>
-            <a:r>
-              <a:rPr lang="en-US" dirty="0" smtClean="0"/>
-              <a:t>Each react component handles one thing</a:t>
-            </a:r>
-          </a:p>
-          <a:p>
-            <a:r>
-              <a:rPr lang="en-US" dirty="0" smtClean="0"/>
-              <a:t>Usually written in JSX format</a:t>
-            </a:r>
-          </a:p>
-          <a:p>
-            <a:pPr lvl="1"/>
-            <a:r>
-              <a:rPr lang="en-US" dirty="0" smtClean="0"/>
-              <a:t>Allows for XML/HTML-like syntax directly</a:t>
-            </a:r>
-            <a:br>
-              <a:rPr lang="en-US" dirty="0" smtClean="0"/>
-            </a:br>
-            <a:r>
-              <a:rPr lang="en-US" dirty="0" smtClean="0"/>
-              <a:t>in the JavaScript code</a:t>
-            </a:r>
-          </a:p>
-          <a:p>
-            <a:r>
-              <a:rPr lang="en-US" dirty="0" smtClean="0"/>
-              <a:t>Translates directly into JavaScript</a:t>
-            </a:r>
-          </a:p>
-          <a:p>
-            <a:pPr lvl="1"/>
-            <a:r>
-              <a:rPr lang="en-US" dirty="0" smtClean="0"/>
-              <a:t>Can be run directly in a standard web browser with no additional libraries required</a:t>
-            </a:r>
-          </a:p>
-        </p:txBody>
-      </p:sp>
-      <p:pic>
-        <p:nvPicPr>
-          <p:cNvPr id="10" name="Picture 9"/>
-          <p:cNvPicPr>
-            <a:picLocks noChangeAspect="1"/>
-          </p:cNvPicPr>
-          <p:nvPr/>
-        </p:nvPicPr>
-        <p:blipFill>
-          <a:blip r:embed="rId2"/>
-          <a:stretch>
-            <a:fillRect/>
-          </a:stretch>
-        </p:blipFill>
-        <p:spPr>
-          <a:xfrm>
-            <a:off x="5906366" y="263669"/>
-            <a:ext cx="5200650" cy="6219825"/>
+            <a:off x="7917600" y="2652313"/>
+            <a:ext cx="1725164" cy="769441"/>
           </a:xfrm>
           <a:prstGeom prst="rect">
             <a:avLst/>
           </a:prstGeom>
         </p:spPr>
-      </p:pic>
+        <p:txBody>
+          <a:bodyPr wrap="square">
+            <a:spAutoFit/>
+          </a:bodyPr>
+          <a:lstStyle/>
+          <a:p>
+            <a:r>
+              <a:rPr lang="en-US" sz="4400" dirty="0">
+                <a:solidFill>
+                  <a:srgbClr val="61DAFB"/>
+                </a:solidFill>
+                <a:latin typeface="proxima-nova"/>
+              </a:rPr>
+              <a:t>React</a:t>
+            </a:r>
+            <a:endParaRPr lang="en-US" sz="4400" dirty="0"/>
+          </a:p>
+        </p:txBody>
+      </p:sp>
     </p:spTree>
     <p:extLst>
       <p:ext uri="{BB962C8B-B14F-4D97-AF65-F5344CB8AC3E}">
-        <p14:creationId xmlns:p14="http://schemas.microsoft.com/office/powerpoint/2010/main" val="2331403626"/>
-      </p:ext>
-    </p:extLst>
-  </p:cSld>
-  <p:clrMapOvr>
-    <a:masterClrMapping/>
-  </p:clrMapOvr>
-  <p:timing>
-    <p:tnLst>
-      <p:par>
-        <p:cTn id="1" dur="indefinite" restart="never" nodeType="tmRoot"/>
-      </p:par>
-    </p:tnLst>
-  </p:timing>
-</p:sld>
-</file>
-
-<file path=ppt/slides/slide5.xml><?xml version="1.0" encoding="utf-8"?>
-<p:sld xmlns:a="http://schemas.openxmlformats.org/drawingml/2006/main" xmlns:r="http://schemas.openxmlformats.org/officeDocument/2006/relationships" xmlns:p="http://schemas.openxmlformats.org/presentationml/2006/main">
-  <p:cSld>
-    <p:spTree>
-      <p:nvGrpSpPr>
-        <p:cNvPr id="1" name=""/>
-        <p:cNvGrpSpPr/>
-        <p:nvPr/>
-      </p:nvGrpSpPr>
-      <p:grpSpPr>
-        <a:xfrm>
-          <a:off x="0" y="0"/>
-          <a:ext cx="0" cy="0"/>
-          <a:chOff x="0" y="0"/>
-          <a:chExt cx="0" cy="0"/>
-        </a:xfrm>
-      </p:grpSpPr>
-      <p:sp>
-        <p:nvSpPr>
-          <p:cNvPr id="2" name="Title 1"/>
-          <p:cNvSpPr>
-            <a:spLocks noGrp="1"/>
-          </p:cNvSpPr>
-          <p:nvPr>
-            <p:ph type="title"/>
-          </p:nvPr>
-        </p:nvSpPr>
-        <p:spPr/>
-        <p:txBody>
-          <a:bodyPr/>
-          <a:lstStyle/>
-          <a:p>
-            <a:r>
-              <a:rPr lang="en-US" dirty="0" smtClean="0"/>
-              <a:t>Intro to JSX</a:t>
-            </a:r>
-            <a:endParaRPr lang="en-US" dirty="0"/>
-          </a:p>
-        </p:txBody>
-      </p:sp>
-      <p:sp>
-        <p:nvSpPr>
-          <p:cNvPr id="3" name="Content Placeholder 2"/>
-          <p:cNvSpPr>
-            <a:spLocks noGrp="1"/>
-          </p:cNvSpPr>
-          <p:nvPr>
-            <p:ph idx="1"/>
-          </p:nvPr>
-        </p:nvSpPr>
-        <p:spPr/>
-        <p:txBody>
-          <a:bodyPr/>
-          <a:lstStyle/>
-          <a:p>
-            <a:r>
-              <a:rPr lang="en-US" dirty="0" smtClean="0"/>
-              <a:t>JSX is a JavaScript syntax extension that looks similar to XML/HTML</a:t>
-            </a:r>
-          </a:p>
-          <a:p>
-            <a:r>
-              <a:rPr lang="en-US" dirty="0" smtClean="0"/>
-              <a:t>Offers a concise and familiar syntax for defining components with optional attributes and state</a:t>
-            </a:r>
-          </a:p>
-          <a:p>
-            <a:r>
-              <a:rPr lang="en-US" dirty="0" smtClean="0"/>
-              <a:t>It's more familiar for casual developers such as designers</a:t>
-            </a:r>
-          </a:p>
-          <a:p>
-            <a:endParaRPr lang="en-US" dirty="0" smtClean="0"/>
-          </a:p>
-          <a:p>
-            <a:pPr marL="0" indent="0">
-              <a:buNone/>
-            </a:pPr>
-            <a:r>
-              <a:rPr lang="en-US" dirty="0" smtClean="0"/>
-              <a:t>Each React component is displayed through its render function. This function returns some JSX that defines how the component will display on the page.</a:t>
-            </a:r>
-          </a:p>
-          <a:p>
-            <a:endParaRPr lang="en-US" dirty="0"/>
-          </a:p>
-        </p:txBody>
-      </p:sp>
-      <p:pic>
-        <p:nvPicPr>
-          <p:cNvPr id="4" name="Picture 3"/>
-          <p:cNvPicPr>
-            <a:picLocks noChangeAspect="1"/>
-          </p:cNvPicPr>
-          <p:nvPr/>
-        </p:nvPicPr>
-        <p:blipFill>
-          <a:blip r:embed="rId2"/>
-          <a:stretch>
-            <a:fillRect/>
-          </a:stretch>
-        </p:blipFill>
-        <p:spPr>
-          <a:xfrm>
-            <a:off x="2455574" y="4792373"/>
-            <a:ext cx="5267325" cy="1600200"/>
-          </a:xfrm>
-          <a:prstGeom prst="rect">
-            <a:avLst/>
-          </a:prstGeom>
-        </p:spPr>
-      </p:pic>
-    </p:spTree>
-    <p:extLst>
-      <p:ext uri="{BB962C8B-B14F-4D97-AF65-F5344CB8AC3E}">
-        <p14:creationId xmlns:p14="http://schemas.microsoft.com/office/powerpoint/2010/main" val="1299890869"/>
-      </p:ext>
-    </p:extLst>
-  </p:cSld>
-  <p:clrMapOvr>
-    <a:masterClrMapping/>
-  </p:clrMapOvr>
-  <p:timing>
-    <p:tnLst>
-      <p:par>
-        <p:cTn id="1" dur="indefinite" restart="never" nodeType="tmRoot"/>
-      </p:par>
-    </p:tnLst>
-  </p:timing>
-</p:sld>
-</file>
-
-<file path=ppt/slides/slide6.xml><?xml version="1.0" encoding="utf-8"?>
-<p:sld xmlns:a="http://schemas.openxmlformats.org/drawingml/2006/main" xmlns:r="http://schemas.openxmlformats.org/officeDocument/2006/relationships" xmlns:p="http://schemas.openxmlformats.org/presentationml/2006/main">
-  <p:cSld>
-    <p:spTree>
-      <p:nvGrpSpPr>
-        <p:cNvPr id="1" name=""/>
-        <p:cNvGrpSpPr/>
-        <p:nvPr/>
-      </p:nvGrpSpPr>
-      <p:grpSpPr>
-        <a:xfrm>
-          <a:off x="0" y="0"/>
-          <a:ext cx="0" cy="0"/>
-          <a:chOff x="0" y="0"/>
-          <a:chExt cx="0" cy="0"/>
-        </a:xfrm>
-      </p:grpSpPr>
-      <p:sp>
-        <p:nvSpPr>
-          <p:cNvPr id="2" name="Title 1"/>
-          <p:cNvSpPr>
-            <a:spLocks noGrp="1"/>
-          </p:cNvSpPr>
-          <p:nvPr>
-            <p:ph type="title"/>
-          </p:nvPr>
-        </p:nvSpPr>
-        <p:spPr/>
-        <p:txBody>
-          <a:bodyPr/>
-          <a:lstStyle/>
-          <a:p>
-            <a:r>
-              <a:rPr lang="en-US" dirty="0"/>
-              <a:t>Intro to JSX</a:t>
-            </a:r>
-          </a:p>
-        </p:txBody>
-      </p:sp>
-      <p:sp>
-        <p:nvSpPr>
-          <p:cNvPr id="3" name="Content Placeholder 2"/>
-          <p:cNvSpPr>
-            <a:spLocks noGrp="1"/>
-          </p:cNvSpPr>
-          <p:nvPr>
-            <p:ph idx="1"/>
-          </p:nvPr>
-        </p:nvSpPr>
-        <p:spPr/>
-        <p:txBody>
-          <a:bodyPr/>
-          <a:lstStyle/>
-          <a:p>
-            <a:r>
-              <a:rPr lang="en-US" dirty="0" smtClean="0"/>
-              <a:t>This Render function and some helper JavaScript variables lets us do some really useful things!</a:t>
-            </a:r>
-            <a:endParaRPr lang="en-US" dirty="0"/>
-          </a:p>
-          <a:p>
-            <a:r>
-              <a:rPr lang="en-US" dirty="0" smtClean="0"/>
-              <a:t>Dynamically creating a number of React components from values in a JavaScript array</a:t>
-            </a:r>
-          </a:p>
-          <a:p>
-            <a:endParaRPr lang="en-US" dirty="0"/>
-          </a:p>
-          <a:p>
-            <a:endParaRPr lang="en-US" dirty="0" smtClean="0"/>
-          </a:p>
-          <a:p>
-            <a:endParaRPr lang="en-US" dirty="0" smtClean="0"/>
-          </a:p>
-        </p:txBody>
-      </p:sp>
-      <p:pic>
-        <p:nvPicPr>
-          <p:cNvPr id="4" name="Picture 3"/>
-          <p:cNvPicPr>
-            <a:picLocks noChangeAspect="1"/>
-          </p:cNvPicPr>
-          <p:nvPr/>
-        </p:nvPicPr>
-        <p:blipFill>
-          <a:blip r:embed="rId2"/>
-          <a:stretch>
-            <a:fillRect/>
-          </a:stretch>
-        </p:blipFill>
-        <p:spPr>
-          <a:xfrm>
-            <a:off x="1261872" y="3374735"/>
-            <a:ext cx="5172075" cy="3257550"/>
-          </a:xfrm>
-          <a:prstGeom prst="rect">
-            <a:avLst/>
-          </a:prstGeom>
-        </p:spPr>
-      </p:pic>
-      <p:pic>
-        <p:nvPicPr>
-          <p:cNvPr id="5" name="Picture 4"/>
-          <p:cNvPicPr>
-            <a:picLocks noChangeAspect="1"/>
-          </p:cNvPicPr>
-          <p:nvPr/>
-        </p:nvPicPr>
-        <p:blipFill>
-          <a:blip r:embed="rId3"/>
-          <a:stretch>
-            <a:fillRect/>
-          </a:stretch>
-        </p:blipFill>
-        <p:spPr>
-          <a:xfrm>
-            <a:off x="6742557" y="3541208"/>
-            <a:ext cx="3114675" cy="1562100"/>
-          </a:xfrm>
-          <a:prstGeom prst="rect">
-            <a:avLst/>
-          </a:prstGeom>
-        </p:spPr>
-      </p:pic>
-    </p:spTree>
-    <p:extLst>
-      <p:ext uri="{BB962C8B-B14F-4D97-AF65-F5344CB8AC3E}">
-        <p14:creationId xmlns:p14="http://schemas.microsoft.com/office/powerpoint/2010/main" val="3245742540"/>
-      </p:ext>
-    </p:extLst>
-  </p:cSld>
-  <p:clrMapOvr>
-    <a:masterClrMapping/>
-  </p:clrMapOvr>
-  <p:timing>
-    <p:tnLst>
-      <p:par>
-        <p:cTn id="1" dur="indefinite" restart="never" nodeType="tmRoot"/>
-      </p:par>
-    </p:tnLst>
-  </p:timing>
-</p:sld>
-</file>
-
-<file path=ppt/slides/slide7.xml><?xml version="1.0" encoding="utf-8"?>
-<p:sld xmlns:a="http://schemas.openxmlformats.org/drawingml/2006/main" xmlns:r="http://schemas.openxmlformats.org/officeDocument/2006/relationships" xmlns:p="http://schemas.openxmlformats.org/presentationml/2006/main">
-  <p:cSld>
-    <p:spTree>
-      <p:nvGrpSpPr>
-        <p:cNvPr id="1" name=""/>
-        <p:cNvGrpSpPr/>
-        <p:nvPr/>
-      </p:nvGrpSpPr>
-      <p:grpSpPr>
-        <a:xfrm>
-          <a:off x="0" y="0"/>
-          <a:ext cx="0" cy="0"/>
-          <a:chOff x="0" y="0"/>
-          <a:chExt cx="0" cy="0"/>
-        </a:xfrm>
-      </p:grpSpPr>
-      <p:sp>
-        <p:nvSpPr>
-          <p:cNvPr id="2" name="Title 1"/>
-          <p:cNvSpPr>
-            <a:spLocks noGrp="1"/>
-          </p:cNvSpPr>
-          <p:nvPr>
-            <p:ph type="title"/>
-          </p:nvPr>
-        </p:nvSpPr>
-        <p:spPr/>
-        <p:txBody>
-          <a:bodyPr/>
-          <a:lstStyle/>
-          <a:p>
-            <a:r>
-              <a:rPr lang="en-US" dirty="0" smtClean="0"/>
-              <a:t>React Component State</a:t>
-            </a:r>
-            <a:endParaRPr lang="en-US" dirty="0"/>
-          </a:p>
-        </p:txBody>
-      </p:sp>
-      <p:sp>
-        <p:nvSpPr>
-          <p:cNvPr id="3" name="Content Placeholder 2"/>
-          <p:cNvSpPr>
-            <a:spLocks noGrp="1"/>
-          </p:cNvSpPr>
-          <p:nvPr>
-            <p:ph idx="1"/>
-          </p:nvPr>
-        </p:nvSpPr>
-        <p:spPr/>
-        <p:txBody>
-          <a:bodyPr/>
-          <a:lstStyle/>
-          <a:p>
-            <a:r>
-              <a:rPr lang="en-US" dirty="0" smtClean="0"/>
-              <a:t>More complex React components can have some state information that helps them decide how they should render and display.</a:t>
-            </a:r>
-          </a:p>
-          <a:p>
-            <a:pPr lvl="1"/>
-            <a:r>
-              <a:rPr lang="en-US" dirty="0" smtClean="0"/>
-              <a:t>This could include data like our little example array from before</a:t>
-            </a:r>
-            <a:endParaRPr lang="en-US" dirty="0"/>
-          </a:p>
-          <a:p>
-            <a:r>
-              <a:rPr lang="en-US" dirty="0" smtClean="0"/>
-              <a:t>If the state changes it will trigger a call to the render method so the component can be updated.</a:t>
-            </a:r>
-          </a:p>
-          <a:p>
-            <a:r>
-              <a:rPr lang="en-US" dirty="0" smtClean="0"/>
-              <a:t>Some initial state can be defined in a component by </a:t>
-            </a:r>
-            <a:r>
-              <a:rPr lang="en-US" dirty="0"/>
-              <a:t>overriding the </a:t>
-            </a:r>
-            <a:r>
-              <a:rPr lang="en-US" dirty="0" err="1" smtClean="0"/>
-              <a:t>getInitialState</a:t>
-            </a:r>
-            <a:r>
-              <a:rPr lang="en-US" dirty="0" smtClean="0"/>
-              <a:t> function</a:t>
-            </a:r>
-          </a:p>
-          <a:p>
-            <a:endParaRPr lang="en-US" dirty="0"/>
-          </a:p>
-          <a:p>
-            <a:endParaRPr lang="en-US" dirty="0"/>
-          </a:p>
-          <a:p>
-            <a:endParaRPr lang="en-US" dirty="0" smtClean="0"/>
-          </a:p>
-        </p:txBody>
-      </p:sp>
-      <p:pic>
-        <p:nvPicPr>
-          <p:cNvPr id="6" name="Picture 5"/>
-          <p:cNvPicPr>
-            <a:picLocks noChangeAspect="1"/>
-          </p:cNvPicPr>
-          <p:nvPr/>
-        </p:nvPicPr>
-        <p:blipFill>
-          <a:blip r:embed="rId2"/>
-          <a:stretch>
-            <a:fillRect/>
-          </a:stretch>
-        </p:blipFill>
-        <p:spPr>
-          <a:xfrm>
-            <a:off x="1916239" y="4623868"/>
-            <a:ext cx="7286625" cy="1466850"/>
-          </a:xfrm>
-          <a:prstGeom prst="rect">
-            <a:avLst/>
-          </a:prstGeom>
-        </p:spPr>
-      </p:pic>
-    </p:spTree>
-    <p:extLst>
-      <p:ext uri="{BB962C8B-B14F-4D97-AF65-F5344CB8AC3E}">
-        <p14:creationId xmlns:p14="http://schemas.microsoft.com/office/powerpoint/2010/main" val="3199261419"/>
+        <p14:creationId xmlns:p14="http://schemas.microsoft.com/office/powerpoint/2010/main" val="2834850258"/>
       </p:ext>
     </p:extLst>
   </p:cSld>
@@ -5283,48 +6419,93 @@
           <a:chExt cx="0" cy="0"/>
         </a:xfrm>
       </p:grpSpPr>
+      <p:sp>
+        <p:nvSpPr>
+          <p:cNvPr id="4" name="Title 3"/>
+          <p:cNvSpPr>
+            <a:spLocks noGrp="1"/>
+          </p:cNvSpPr>
+          <p:nvPr>
+            <p:ph type="title"/>
+          </p:nvPr>
+        </p:nvSpPr>
+        <p:spPr/>
+        <p:txBody>
+          <a:bodyPr/>
+          <a:lstStyle/>
+          <a:p>
+            <a:r>
+              <a:rPr lang="en-US" dirty="0">
+                <a:solidFill>
+                  <a:srgbClr val="00D8FF"/>
+                </a:solidFill>
+                <a:effectLst>
+                  <a:outerShdw blurRad="38100" dist="38100" dir="2700000" algn="tl">
+                    <a:srgbClr val="000000">
+                      <a:alpha val="43137"/>
+                    </a:srgbClr>
+                  </a:outerShdw>
+                </a:effectLst>
+              </a:rPr>
+              <a:t>React</a:t>
+            </a:r>
+          </a:p>
+        </p:txBody>
+      </p:sp>
+      <p:sp>
+        <p:nvSpPr>
+          <p:cNvPr id="10" name="Text Placeholder 9"/>
+          <p:cNvSpPr>
+            <a:spLocks noGrp="1"/>
+          </p:cNvSpPr>
+          <p:nvPr>
+            <p:ph type="body" idx="1"/>
+          </p:nvPr>
+        </p:nvSpPr>
+        <p:spPr/>
+        <p:txBody>
+          <a:bodyPr/>
+          <a:lstStyle/>
+          <a:p>
+            <a:r>
+              <a:rPr lang="en-US" dirty="0" smtClean="0"/>
+              <a:t>A JavaScript library for</a:t>
+            </a:r>
+            <a:br>
+              <a:rPr lang="en-US" dirty="0" smtClean="0"/>
+            </a:br>
+            <a:r>
+              <a:rPr lang="en-US" dirty="0" smtClean="0"/>
+              <a:t>building user interfaces</a:t>
+            </a:r>
+            <a:endParaRPr lang="en-US" dirty="0"/>
+          </a:p>
+        </p:txBody>
+      </p:sp>
       <p:pic>
         <p:nvPicPr>
-          <p:cNvPr id="5" name="Picture 4"/>
+          <p:cNvPr id="11" name="Picture 10"/>
           <p:cNvPicPr>
             <a:picLocks noChangeAspect="1"/>
           </p:cNvPicPr>
           <p:nvPr/>
         </p:nvPicPr>
         <p:blipFill>
-          <a:blip r:embed="rId2"/>
+          <a:blip r:embed="rId2">
+            <a:extLst>
+              <a:ext uri="{28A0092B-C50C-407E-A947-70E740481C1C}">
+                <a14:useLocalDpi xmlns:a14="http://schemas.microsoft.com/office/drawing/2010/main" val="0"/>
+              </a:ext>
+            </a:extLst>
+          </a:blip>
           <a:stretch>
             <a:fillRect/>
           </a:stretch>
         </p:blipFill>
         <p:spPr>
           <a:xfrm>
-            <a:off x="0" y="819150"/>
-            <a:ext cx="7781925" cy="6038850"/>
-          </a:xfrm>
-          <a:prstGeom prst="rect">
-            <a:avLst/>
-          </a:prstGeom>
-        </p:spPr>
-      </p:pic>
-      <p:pic>
-        <p:nvPicPr>
-          <p:cNvPr id="6" name="Picture 5"/>
-          <p:cNvPicPr>
-            <a:picLocks noChangeAspect="1"/>
-          </p:cNvPicPr>
-          <p:nvPr/>
-        </p:nvPicPr>
-        <p:blipFill>
-          <a:blip r:embed="rId3"/>
-          <a:stretch>
-            <a:fillRect/>
-          </a:stretch>
-        </p:blipFill>
-        <p:spPr>
-          <a:xfrm>
-            <a:off x="8174193" y="38100"/>
-            <a:ext cx="3114675" cy="1562100"/>
+            <a:off x="4063999" y="3707291"/>
+            <a:ext cx="1197309" cy="1197309"/>
           </a:xfrm>
           <a:prstGeom prst="rect">
             <a:avLst/>
@@ -5334,7 +6515,7 @@
     </p:spTree>
     <p:extLst>
       <p:ext uri="{BB962C8B-B14F-4D97-AF65-F5344CB8AC3E}">
-        <p14:creationId xmlns:p14="http://schemas.microsoft.com/office/powerpoint/2010/main" val="2049038227"/>
+        <p14:creationId xmlns:p14="http://schemas.microsoft.com/office/powerpoint/2010/main" val="3080495590"/>
       </p:ext>
     </p:extLst>
   </p:cSld>
@@ -5378,76 +6559,145 @@
             <p:ph type="title"/>
           </p:nvPr>
         </p:nvSpPr>
-        <p:spPr/>
-        <p:txBody>
-          <a:bodyPr/>
-          <a:lstStyle/>
-          <a:p>
-            <a:r>
-              <a:rPr lang="en-US" dirty="0" smtClean="0"/>
-              <a:t>Flux</a:t>
-            </a:r>
-            <a:endParaRPr lang="en-US" dirty="0"/>
-          </a:p>
-        </p:txBody>
-      </p:sp>
-      <p:sp>
-        <p:nvSpPr>
-          <p:cNvPr id="10" name="Text Placeholder 9"/>
-          <p:cNvSpPr>
-            <a:spLocks noGrp="1"/>
-          </p:cNvSpPr>
-          <p:nvPr>
-            <p:ph type="body" idx="1"/>
-          </p:nvPr>
-        </p:nvSpPr>
-        <p:spPr/>
-        <p:txBody>
-          <a:bodyPr/>
-          <a:lstStyle/>
-          <a:p>
-            <a:r>
-              <a:rPr lang="en-US" dirty="0" smtClean="0"/>
-              <a:t>An architecture for building</a:t>
+        <p:spPr>
+          <a:xfrm>
+            <a:off x="279492" y="263669"/>
+            <a:ext cx="5388269" cy="933449"/>
+          </a:xfrm>
+        </p:spPr>
+        <p:txBody>
+          <a:bodyPr/>
+          <a:lstStyle/>
+          <a:p>
+            <a:r>
+              <a:rPr lang="en-US" dirty="0" smtClean="0"/>
+              <a:t>React Overview</a:t>
+            </a:r>
+            <a:endParaRPr lang="en-US" dirty="0"/>
+          </a:p>
+        </p:txBody>
+      </p:sp>
+      <p:sp>
+        <p:nvSpPr>
+          <p:cNvPr id="5" name="Content Placeholder 4"/>
+          <p:cNvSpPr>
+            <a:spLocks noGrp="1"/>
+          </p:cNvSpPr>
+          <p:nvPr>
+            <p:ph idx="1"/>
+          </p:nvPr>
+        </p:nvSpPr>
+        <p:spPr>
+          <a:xfrm>
+            <a:off x="279492" y="1197118"/>
+            <a:ext cx="4786366" cy="5024005"/>
+          </a:xfrm>
+        </p:spPr>
+        <p:txBody>
+          <a:bodyPr/>
+          <a:lstStyle/>
+          <a:p>
+            <a:r>
+              <a:rPr lang="en-US" dirty="0" smtClean="0"/>
+              <a:t>Just the User Interface</a:t>
+            </a:r>
+          </a:p>
+          <a:p>
+            <a:pPr lvl="1"/>
+            <a:r>
+              <a:rPr lang="en-US" dirty="0" smtClean="0"/>
+              <a:t>Handles the V in the MVC design pattern</a:t>
+            </a:r>
+          </a:p>
+          <a:p>
+            <a:r>
+              <a:rPr lang="en-US" dirty="0"/>
+              <a:t>Simple </a:t>
+            </a:r>
+            <a:r>
+              <a:rPr lang="en-US" dirty="0" smtClean="0"/>
+              <a:t>Components</a:t>
+            </a:r>
+          </a:p>
+          <a:p>
+            <a:pPr lvl="1"/>
+            <a:r>
+              <a:rPr lang="en-US" dirty="0" smtClean="0"/>
+              <a:t>Each react component handles one thing</a:t>
+            </a:r>
+          </a:p>
+          <a:p>
+            <a:r>
+              <a:rPr lang="en-US" dirty="0" smtClean="0"/>
+              <a:t>Usually written in JSX format</a:t>
+            </a:r>
+          </a:p>
+          <a:p>
+            <a:pPr lvl="1"/>
+            <a:r>
+              <a:rPr lang="en-US" dirty="0" smtClean="0"/>
+              <a:t>Allows for XML/HTML-like syntax directly</a:t>
             </a:r>
             <a:br>
               <a:rPr lang="en-US" dirty="0" smtClean="0"/>
             </a:br>
             <a:r>
               <a:rPr lang="en-US" dirty="0" smtClean="0"/>
-              <a:t>client-side web </a:t>
-            </a:r>
-            <a:r>
-              <a:rPr lang="en-US" dirty="0"/>
-              <a:t>applications</a:t>
+              <a:t>in the JavaScript code</a:t>
+            </a:r>
+          </a:p>
+          <a:p>
+            <a:r>
+              <a:rPr lang="en-US" dirty="0" smtClean="0"/>
+              <a:t>Translates directly into JavaScript</a:t>
+            </a:r>
+          </a:p>
+          <a:p>
+            <a:pPr lvl="1"/>
+            <a:r>
+              <a:rPr lang="en-US" dirty="0" smtClean="0"/>
+              <a:t>Can be run directly in a standard web browser with no additional libraries required</a:t>
+            </a:r>
+          </a:p>
+          <a:p>
+            <a:r>
+              <a:rPr lang="en-US" dirty="0" smtClean="0"/>
+              <a:t>Designed by Facebook and Instagram</a:t>
+            </a:r>
+          </a:p>
+          <a:p>
+            <a:pPr lvl="1"/>
+            <a:r>
+              <a:rPr lang="en-US" dirty="0" smtClean="0"/>
+              <a:t>Powers the UI of both of these websites</a:t>
+            </a:r>
+          </a:p>
+          <a:p>
+            <a:r>
+              <a:rPr lang="en-US" dirty="0" smtClean="0"/>
+              <a:t>Provided as Open Source software</a:t>
             </a:r>
           </a:p>
         </p:txBody>
       </p:sp>
       <p:pic>
         <p:nvPicPr>
-          <p:cNvPr id="2" name="Picture 1"/>
+          <p:cNvPr id="10" name="Picture 9"/>
           <p:cNvPicPr>
             <a:picLocks noChangeAspect="1"/>
           </p:cNvPicPr>
           <p:nvPr/>
         </p:nvPicPr>
         <p:blipFill>
-          <a:blip r:embed="rId2">
-            <a:extLst>
-              <a:ext uri="{28A0092B-C50C-407E-A947-70E740481C1C}">
-                <a14:useLocalDpi xmlns:a14="http://schemas.microsoft.com/office/drawing/2010/main" val="0"/>
-              </a:ext>
-            </a:extLst>
-          </a:blip>
+          <a:blip r:embed="rId2"/>
           <a:stretch>
             <a:fillRect/>
           </a:stretch>
         </p:blipFill>
         <p:spPr>
           <a:xfrm>
-            <a:off x="4082472" y="3484417"/>
-            <a:ext cx="1561209" cy="1561209"/>
+            <a:off x="5906366" y="263669"/>
+            <a:ext cx="5200650" cy="6219825"/>
           </a:xfrm>
           <a:prstGeom prst="rect">
             <a:avLst/>
@@ -5457,7 +6707,7 @@
     </p:spTree>
     <p:extLst>
       <p:ext uri="{BB962C8B-B14F-4D97-AF65-F5344CB8AC3E}">
-        <p14:creationId xmlns:p14="http://schemas.microsoft.com/office/powerpoint/2010/main" val="2278960357"/>
+        <p14:creationId xmlns:p14="http://schemas.microsoft.com/office/powerpoint/2010/main" val="2331403626"/>
       </p:ext>
     </p:extLst>
   </p:cSld>

</xml_diff>